<commit_message>
cascaded PWM for DAB implementation
</commit_message>
<xml_diff>
--- a/dab_development.pptx
+++ b/dab_development.pptx
@@ -9,6 +9,8 @@
     <p:sldId id="257" r:id="rId3"/>
     <p:sldId id="258" r:id="rId4"/>
     <p:sldId id="259" r:id="rId5"/>
+    <p:sldId id="260" r:id="rId6"/>
+    <p:sldId id="261" r:id="rId7"/>
   </p:sldIdLst>
   <p:sldSz cx="12192000" cy="6858000"/>
   <p:notesSz cx="6858000" cy="9144000"/>
@@ -262,7 +264,7 @@
           <a:p>
             <a:fld id="{C8B5CE37-4518-4420-8E81-BDF4C2BF2F94}" type="datetimeFigureOut">
               <a:rPr lang="en-US" smtClean="0"/>
-              <a:t>7/3/2024</a:t>
+              <a:t>7/4/2024</a:t>
             </a:fld>
             <a:endParaRPr lang="en-US"/>
           </a:p>
@@ -460,7 +462,7 @@
           <a:p>
             <a:fld id="{C8B5CE37-4518-4420-8E81-BDF4C2BF2F94}" type="datetimeFigureOut">
               <a:rPr lang="en-US" smtClean="0"/>
-              <a:t>7/3/2024</a:t>
+              <a:t>7/4/2024</a:t>
             </a:fld>
             <a:endParaRPr lang="en-US"/>
           </a:p>
@@ -668,7 +670,7 @@
           <a:p>
             <a:fld id="{C8B5CE37-4518-4420-8E81-BDF4C2BF2F94}" type="datetimeFigureOut">
               <a:rPr lang="en-US" smtClean="0"/>
-              <a:t>7/3/2024</a:t>
+              <a:t>7/4/2024</a:t>
             </a:fld>
             <a:endParaRPr lang="en-US"/>
           </a:p>
@@ -866,7 +868,7 @@
           <a:p>
             <a:fld id="{C8B5CE37-4518-4420-8E81-BDF4C2BF2F94}" type="datetimeFigureOut">
               <a:rPr lang="en-US" smtClean="0"/>
-              <a:t>7/3/2024</a:t>
+              <a:t>7/4/2024</a:t>
             </a:fld>
             <a:endParaRPr lang="en-US"/>
           </a:p>
@@ -1141,7 +1143,7 @@
           <a:p>
             <a:fld id="{C8B5CE37-4518-4420-8E81-BDF4C2BF2F94}" type="datetimeFigureOut">
               <a:rPr lang="en-US" smtClean="0"/>
-              <a:t>7/3/2024</a:t>
+              <a:t>7/4/2024</a:t>
             </a:fld>
             <a:endParaRPr lang="en-US"/>
           </a:p>
@@ -1406,7 +1408,7 @@
           <a:p>
             <a:fld id="{C8B5CE37-4518-4420-8E81-BDF4C2BF2F94}" type="datetimeFigureOut">
               <a:rPr lang="en-US" smtClean="0"/>
-              <a:t>7/3/2024</a:t>
+              <a:t>7/4/2024</a:t>
             </a:fld>
             <a:endParaRPr lang="en-US"/>
           </a:p>
@@ -1818,7 +1820,7 @@
           <a:p>
             <a:fld id="{C8B5CE37-4518-4420-8E81-BDF4C2BF2F94}" type="datetimeFigureOut">
               <a:rPr lang="en-US" smtClean="0"/>
-              <a:t>7/3/2024</a:t>
+              <a:t>7/4/2024</a:t>
             </a:fld>
             <a:endParaRPr lang="en-US"/>
           </a:p>
@@ -1959,7 +1961,7 @@
           <a:p>
             <a:fld id="{C8B5CE37-4518-4420-8E81-BDF4C2BF2F94}" type="datetimeFigureOut">
               <a:rPr lang="en-US" smtClean="0"/>
-              <a:t>7/3/2024</a:t>
+              <a:t>7/4/2024</a:t>
             </a:fld>
             <a:endParaRPr lang="en-US"/>
           </a:p>
@@ -2072,7 +2074,7 @@
           <a:p>
             <a:fld id="{C8B5CE37-4518-4420-8E81-BDF4C2BF2F94}" type="datetimeFigureOut">
               <a:rPr lang="en-US" smtClean="0"/>
-              <a:t>7/3/2024</a:t>
+              <a:t>7/4/2024</a:t>
             </a:fld>
             <a:endParaRPr lang="en-US"/>
           </a:p>
@@ -2383,7 +2385,7 @@
           <a:p>
             <a:fld id="{C8B5CE37-4518-4420-8E81-BDF4C2BF2F94}" type="datetimeFigureOut">
               <a:rPr lang="en-US" smtClean="0"/>
-              <a:t>7/3/2024</a:t>
+              <a:t>7/4/2024</a:t>
             </a:fld>
             <a:endParaRPr lang="en-US"/>
           </a:p>
@@ -2671,7 +2673,7 @@
           <a:p>
             <a:fld id="{C8B5CE37-4518-4420-8E81-BDF4C2BF2F94}" type="datetimeFigureOut">
               <a:rPr lang="en-US" smtClean="0"/>
-              <a:t>7/3/2024</a:t>
+              <a:t>7/4/2024</a:t>
             </a:fld>
             <a:endParaRPr lang="en-US"/>
           </a:p>
@@ -2912,7 +2914,7 @@
           <a:p>
             <a:fld id="{C8B5CE37-4518-4420-8E81-BDF4C2BF2F94}" type="datetimeFigureOut">
               <a:rPr lang="en-US" smtClean="0"/>
-              <a:t>7/3/2024</a:t>
+              <a:t>7/4/2024</a:t>
             </a:fld>
             <a:endParaRPr lang="en-US"/>
           </a:p>
@@ -3352,7 +3354,7 @@
           <a:p>
             <a:r>
               <a:rPr lang="en-GB" dirty="0"/>
-              <a:t>DAB</a:t>
+              <a:t>Dual Active Bridge</a:t>
             </a:r>
             <a:endParaRPr lang="en-US" dirty="0"/>
           </a:p>
@@ -3418,7 +3420,7 @@
           <p:cNvPr id="2" name="Title 1">
             <a:extLst>
               <a:ext uri="{FF2B5EF4-FFF2-40B4-BE49-F238E27FC236}">
-                <a16:creationId xmlns:a16="http://schemas.microsoft.com/office/drawing/2014/main" id="{330EA7DA-EBCE-C9B3-797A-5E82613DE046}"/>
+                <a16:creationId xmlns:a16="http://schemas.microsoft.com/office/drawing/2014/main" id="{0258912D-D1F0-2820-FE4A-F965C3A27846}"/>
               </a:ext>
             </a:extLst>
           </p:cNvPr>
@@ -3429,83 +3431,911 @@
             <p:ph type="title"/>
           </p:nvPr>
         </p:nvSpPr>
-        <p:spPr/>
+        <p:spPr>
+          <a:xfrm>
+            <a:off x="317090" y="395860"/>
+            <a:ext cx="10704867" cy="1325563"/>
+          </a:xfrm>
+        </p:spPr>
         <p:txBody>
           <a:bodyPr/>
           <a:lstStyle/>
           <a:p>
             <a:r>
               <a:rPr lang="en-GB" dirty="0"/>
-              <a:t>Cascaded PWM</a:t>
+              <a:t>PWM Configuration – Cascaded PWM 1-2-3-4</a:t>
             </a:r>
             <a:endParaRPr lang="en-US" dirty="0"/>
           </a:p>
         </p:txBody>
       </p:sp>
-      <p:sp>
-        <p:nvSpPr>
-          <p:cNvPr id="3" name="Content Placeholder 2">
-            <a:extLst>
-              <a:ext uri="{FF2B5EF4-FFF2-40B4-BE49-F238E27FC236}">
-                <a16:creationId xmlns:a16="http://schemas.microsoft.com/office/drawing/2014/main" id="{48AA0652-C3C0-F310-A420-E0B19728E0B2}"/>
-              </a:ext>
-            </a:extLst>
-          </p:cNvPr>
-          <p:cNvSpPr>
-            <a:spLocks noGrp="1"/>
-          </p:cNvSpPr>
-          <p:nvPr>
-            <p:ph idx="1"/>
-          </p:nvPr>
-        </p:nvSpPr>
-        <p:spPr/>
-        <p:txBody>
-          <a:bodyPr/>
-          <a:lstStyle/>
-          <a:p>
-            <a:r>
-              <a:rPr lang="en-GB" dirty="0"/>
-              <a:t>Pros</a:t>
-            </a:r>
-          </a:p>
-          <a:p>
-            <a:pPr lvl="1"/>
-            <a:r>
-              <a:rPr lang="en-GB" dirty="0"/>
-              <a:t>Single PWM update request bit for all PWMs</a:t>
-            </a:r>
-          </a:p>
-          <a:p>
-            <a:pPr lvl="1"/>
-            <a:endParaRPr lang="en-GB" dirty="0"/>
-          </a:p>
-          <a:p>
-            <a:r>
-              <a:rPr lang="en-GB" dirty="0"/>
-              <a:t>Cons</a:t>
-            </a:r>
-          </a:p>
-          <a:p>
-            <a:pPr lvl="1"/>
-            <a:r>
-              <a:rPr lang="en-GB" dirty="0"/>
-              <a:t>Phase defined needs to follow the order of the cascade PWMs (if cascade is PWM 1-2-3-4, the phase of the leading PWM will the reference of the client PWM)</a:t>
-            </a:r>
-          </a:p>
-          <a:p>
-            <a:pPr lvl="1"/>
-            <a:r>
-              <a:rPr lang="en-GB" dirty="0"/>
-              <a:t>Calculation of Phases done in runtime needs to be considered</a:t>
-            </a:r>
-            <a:endParaRPr lang="en-US" dirty="0"/>
-          </a:p>
-        </p:txBody>
-      </p:sp>
+      <p:pic>
+        <p:nvPicPr>
+          <p:cNvPr id="5" name="Picture 4">
+            <a:extLst>
+              <a:ext uri="{FF2B5EF4-FFF2-40B4-BE49-F238E27FC236}">
+                <a16:creationId xmlns:a16="http://schemas.microsoft.com/office/drawing/2014/main" id="{7D0F3AC7-FDF1-1A40-5F7B-B8C98C81DD3B}"/>
+              </a:ext>
+            </a:extLst>
+          </p:cNvPr>
+          <p:cNvPicPr>
+            <a:picLocks noChangeAspect="1"/>
+          </p:cNvPicPr>
+          <p:nvPr/>
+        </p:nvPicPr>
+        <p:blipFill>
+          <a:blip r:embed="rId2"/>
+          <a:stretch>
+            <a:fillRect/>
+          </a:stretch>
+        </p:blipFill>
+        <p:spPr>
+          <a:xfrm>
+            <a:off x="1090264" y="1642670"/>
+            <a:ext cx="8733277" cy="4534293"/>
+          </a:xfrm>
+          <a:prstGeom prst="rect">
+            <a:avLst/>
+          </a:prstGeom>
+        </p:spPr>
+      </p:pic>
+      <p:sp>
+        <p:nvSpPr>
+          <p:cNvPr id="6" name="TextBox 5">
+            <a:extLst>
+              <a:ext uri="{FF2B5EF4-FFF2-40B4-BE49-F238E27FC236}">
+                <a16:creationId xmlns:a16="http://schemas.microsoft.com/office/drawing/2014/main" id="{2BBDBC05-272F-859B-E653-19791FE5F82B}"/>
+              </a:ext>
+            </a:extLst>
+          </p:cNvPr>
+          <p:cNvSpPr txBox="1"/>
+          <p:nvPr/>
+        </p:nvSpPr>
+        <p:spPr>
+          <a:xfrm>
+            <a:off x="1720645" y="2783567"/>
+            <a:ext cx="875304" cy="369332"/>
+          </a:xfrm>
+          <a:prstGeom prst="rect">
+            <a:avLst/>
+          </a:prstGeom>
+          <a:noFill/>
+        </p:spPr>
+        <p:txBody>
+          <a:bodyPr wrap="none" rtlCol="0">
+            <a:spAutoFit/>
+          </a:bodyPr>
+          <a:lstStyle/>
+          <a:p>
+            <a:r>
+              <a:rPr lang="en-GB" dirty="0">
+                <a:solidFill>
+                  <a:srgbClr val="FFFF00"/>
+                </a:solidFill>
+              </a:rPr>
+              <a:t>PWM1 </a:t>
+            </a:r>
+            <a:endParaRPr lang="en-US" dirty="0">
+              <a:solidFill>
+                <a:srgbClr val="FFFF00"/>
+              </a:solidFill>
+            </a:endParaRPr>
+          </a:p>
+        </p:txBody>
+      </p:sp>
+      <p:sp>
+        <p:nvSpPr>
+          <p:cNvPr id="7" name="TextBox 6">
+            <a:extLst>
+              <a:ext uri="{FF2B5EF4-FFF2-40B4-BE49-F238E27FC236}">
+                <a16:creationId xmlns:a16="http://schemas.microsoft.com/office/drawing/2014/main" id="{00F37D87-89A7-3A8C-44C2-C57F7128E9FF}"/>
+              </a:ext>
+            </a:extLst>
+          </p:cNvPr>
+          <p:cNvSpPr txBox="1"/>
+          <p:nvPr/>
+        </p:nvSpPr>
+        <p:spPr>
+          <a:xfrm>
+            <a:off x="1720645" y="3379827"/>
+            <a:ext cx="828817" cy="369332"/>
+          </a:xfrm>
+          <a:prstGeom prst="rect">
+            <a:avLst/>
+          </a:prstGeom>
+          <a:noFill/>
+        </p:spPr>
+        <p:txBody>
+          <a:bodyPr wrap="none" rtlCol="0">
+            <a:spAutoFit/>
+          </a:bodyPr>
+          <a:lstStyle/>
+          <a:p>
+            <a:r>
+              <a:rPr lang="en-GB" dirty="0">
+                <a:solidFill>
+                  <a:schemeClr val="accent5">
+                    <a:lumMod val="60000"/>
+                    <a:lumOff val="40000"/>
+                  </a:schemeClr>
+                </a:solidFill>
+              </a:rPr>
+              <a:t>PWM3</a:t>
+            </a:r>
+            <a:endParaRPr lang="en-US" dirty="0">
+              <a:solidFill>
+                <a:schemeClr val="accent5">
+                  <a:lumMod val="60000"/>
+                  <a:lumOff val="40000"/>
+                </a:schemeClr>
+              </a:solidFill>
+            </a:endParaRPr>
+          </a:p>
+        </p:txBody>
+      </p:sp>
+      <p:sp>
+        <p:nvSpPr>
+          <p:cNvPr id="8" name="TextBox 7">
+            <a:extLst>
+              <a:ext uri="{FF2B5EF4-FFF2-40B4-BE49-F238E27FC236}">
+                <a16:creationId xmlns:a16="http://schemas.microsoft.com/office/drawing/2014/main" id="{5EBB2003-9E6D-1B82-2E73-11E16D86EE53}"/>
+              </a:ext>
+            </a:extLst>
+          </p:cNvPr>
+          <p:cNvSpPr txBox="1"/>
+          <p:nvPr/>
+        </p:nvSpPr>
+        <p:spPr>
+          <a:xfrm>
+            <a:off x="1674158" y="4920828"/>
+            <a:ext cx="875304" cy="369332"/>
+          </a:xfrm>
+          <a:prstGeom prst="rect">
+            <a:avLst/>
+          </a:prstGeom>
+          <a:noFill/>
+        </p:spPr>
+        <p:txBody>
+          <a:bodyPr wrap="none" rtlCol="0">
+            <a:spAutoFit/>
+          </a:bodyPr>
+          <a:lstStyle/>
+          <a:p>
+            <a:r>
+              <a:rPr lang="en-GB" dirty="0">
+                <a:solidFill>
+                  <a:schemeClr val="accent4">
+                    <a:lumMod val="40000"/>
+                    <a:lumOff val="60000"/>
+                  </a:schemeClr>
+                </a:solidFill>
+              </a:rPr>
+              <a:t>PWM2 </a:t>
+            </a:r>
+            <a:endParaRPr lang="en-US" dirty="0">
+              <a:solidFill>
+                <a:schemeClr val="accent4">
+                  <a:lumMod val="40000"/>
+                  <a:lumOff val="60000"/>
+                </a:schemeClr>
+              </a:solidFill>
+            </a:endParaRPr>
+          </a:p>
+        </p:txBody>
+      </p:sp>
+      <p:sp>
+        <p:nvSpPr>
+          <p:cNvPr id="9" name="TextBox 8">
+            <a:extLst>
+              <a:ext uri="{FF2B5EF4-FFF2-40B4-BE49-F238E27FC236}">
+                <a16:creationId xmlns:a16="http://schemas.microsoft.com/office/drawing/2014/main" id="{2C13024E-5386-7B08-9187-66BF58311DF7}"/>
+              </a:ext>
+            </a:extLst>
+          </p:cNvPr>
+          <p:cNvSpPr txBox="1"/>
+          <p:nvPr/>
+        </p:nvSpPr>
+        <p:spPr>
+          <a:xfrm>
+            <a:off x="1743888" y="5807631"/>
+            <a:ext cx="828817" cy="369332"/>
+          </a:xfrm>
+          <a:prstGeom prst="rect">
+            <a:avLst/>
+          </a:prstGeom>
+          <a:noFill/>
+        </p:spPr>
+        <p:txBody>
+          <a:bodyPr wrap="none" rtlCol="0">
+            <a:spAutoFit/>
+          </a:bodyPr>
+          <a:lstStyle/>
+          <a:p>
+            <a:r>
+              <a:rPr lang="en-GB" dirty="0">
+                <a:solidFill>
+                  <a:schemeClr val="accent3">
+                    <a:lumMod val="60000"/>
+                    <a:lumOff val="40000"/>
+                  </a:schemeClr>
+                </a:solidFill>
+              </a:rPr>
+              <a:t>PWM4</a:t>
+            </a:r>
+            <a:endParaRPr lang="en-US" dirty="0">
+              <a:solidFill>
+                <a:schemeClr val="accent3">
+                  <a:lumMod val="60000"/>
+                  <a:lumOff val="40000"/>
+                </a:schemeClr>
+              </a:solidFill>
+            </a:endParaRPr>
+          </a:p>
+        </p:txBody>
+      </p:sp>
+      <p:cxnSp>
+        <p:nvCxnSpPr>
+          <p:cNvPr id="11" name="Straight Connector 10">
+            <a:extLst>
+              <a:ext uri="{FF2B5EF4-FFF2-40B4-BE49-F238E27FC236}">
+                <a16:creationId xmlns:a16="http://schemas.microsoft.com/office/drawing/2014/main" id="{D7085410-FDE2-DC16-B699-00458087F358}"/>
+              </a:ext>
+            </a:extLst>
+          </p:cNvPr>
+          <p:cNvCxnSpPr>
+            <a:cxnSpLocks/>
+          </p:cNvCxnSpPr>
+          <p:nvPr/>
+        </p:nvCxnSpPr>
+        <p:spPr>
+          <a:xfrm>
+            <a:off x="4434347" y="1455857"/>
+            <a:ext cx="0" cy="2879757"/>
+          </a:xfrm>
+          <a:prstGeom prst="line">
+            <a:avLst/>
+          </a:prstGeom>
+          <a:ln>
+            <a:solidFill>
+              <a:srgbClr val="FFFF00"/>
+            </a:solidFill>
+            <a:prstDash val="dashDot"/>
+          </a:ln>
+        </p:spPr>
+        <p:style>
+          <a:lnRef idx="2">
+            <a:schemeClr val="accent1"/>
+          </a:lnRef>
+          <a:fillRef idx="0">
+            <a:schemeClr val="accent1"/>
+          </a:fillRef>
+          <a:effectRef idx="1">
+            <a:schemeClr val="accent1"/>
+          </a:effectRef>
+          <a:fontRef idx="minor">
+            <a:schemeClr val="tx1"/>
+          </a:fontRef>
+        </p:style>
+      </p:cxnSp>
+      <p:cxnSp>
+        <p:nvCxnSpPr>
+          <p:cNvPr id="12" name="Straight Connector 11">
+            <a:extLst>
+              <a:ext uri="{FF2B5EF4-FFF2-40B4-BE49-F238E27FC236}">
+                <a16:creationId xmlns:a16="http://schemas.microsoft.com/office/drawing/2014/main" id="{7D41A4D4-3453-376C-8D12-ECC05134138C}"/>
+              </a:ext>
+            </a:extLst>
+          </p:cNvPr>
+          <p:cNvCxnSpPr>
+            <a:cxnSpLocks/>
+          </p:cNvCxnSpPr>
+          <p:nvPr/>
+        </p:nvCxnSpPr>
+        <p:spPr>
+          <a:xfrm flipH="1">
+            <a:off x="4531470" y="1549265"/>
+            <a:ext cx="6117" cy="2786349"/>
+          </a:xfrm>
+          <a:prstGeom prst="line">
+            <a:avLst/>
+          </a:prstGeom>
+          <a:ln>
+            <a:solidFill>
+              <a:srgbClr val="FFFF00"/>
+            </a:solidFill>
+            <a:prstDash val="dashDot"/>
+          </a:ln>
+        </p:spPr>
+        <p:style>
+          <a:lnRef idx="2">
+            <a:schemeClr val="accent1"/>
+          </a:lnRef>
+          <a:fillRef idx="0">
+            <a:schemeClr val="accent1"/>
+          </a:fillRef>
+          <a:effectRef idx="1">
+            <a:schemeClr val="accent1"/>
+          </a:effectRef>
+          <a:fontRef idx="minor">
+            <a:schemeClr val="tx1"/>
+          </a:fontRef>
+        </p:style>
+      </p:cxnSp>
+      <p:cxnSp>
+        <p:nvCxnSpPr>
+          <p:cNvPr id="13" name="Straight Connector 12">
+            <a:extLst>
+              <a:ext uri="{FF2B5EF4-FFF2-40B4-BE49-F238E27FC236}">
+                <a16:creationId xmlns:a16="http://schemas.microsoft.com/office/drawing/2014/main" id="{CA5688C9-2D67-F560-E1BC-7A99A5291D1C}"/>
+              </a:ext>
+            </a:extLst>
+          </p:cNvPr>
+          <p:cNvCxnSpPr>
+            <a:cxnSpLocks/>
+          </p:cNvCxnSpPr>
+          <p:nvPr/>
+        </p:nvCxnSpPr>
+        <p:spPr>
+          <a:xfrm>
+            <a:off x="5206181" y="4109098"/>
+            <a:ext cx="0" cy="2611255"/>
+          </a:xfrm>
+          <a:prstGeom prst="line">
+            <a:avLst/>
+          </a:prstGeom>
+          <a:ln>
+            <a:solidFill>
+              <a:schemeClr val="accent1">
+                <a:lumMod val="60000"/>
+                <a:lumOff val="40000"/>
+              </a:schemeClr>
+            </a:solidFill>
+            <a:prstDash val="dashDot"/>
+          </a:ln>
+        </p:spPr>
+        <p:style>
+          <a:lnRef idx="2">
+            <a:schemeClr val="accent1"/>
+          </a:lnRef>
+          <a:fillRef idx="0">
+            <a:schemeClr val="accent1"/>
+          </a:fillRef>
+          <a:effectRef idx="1">
+            <a:schemeClr val="accent1"/>
+          </a:effectRef>
+          <a:fontRef idx="minor">
+            <a:schemeClr val="tx1"/>
+          </a:fontRef>
+        </p:style>
+      </p:cxnSp>
+      <p:cxnSp>
+        <p:nvCxnSpPr>
+          <p:cNvPr id="14" name="Straight Connector 13">
+            <a:extLst>
+              <a:ext uri="{FF2B5EF4-FFF2-40B4-BE49-F238E27FC236}">
+                <a16:creationId xmlns:a16="http://schemas.microsoft.com/office/drawing/2014/main" id="{D58E3D59-472E-86F2-C639-D4DBBF463BA6}"/>
+              </a:ext>
+            </a:extLst>
+          </p:cNvPr>
+          <p:cNvCxnSpPr>
+            <a:cxnSpLocks/>
+          </p:cNvCxnSpPr>
+          <p:nvPr/>
+        </p:nvCxnSpPr>
+        <p:spPr>
+          <a:xfrm>
+            <a:off x="5309421" y="4137271"/>
+            <a:ext cx="0" cy="2676490"/>
+          </a:xfrm>
+          <a:prstGeom prst="line">
+            <a:avLst/>
+          </a:prstGeom>
+          <a:ln>
+            <a:solidFill>
+              <a:schemeClr val="accent1">
+                <a:lumMod val="60000"/>
+                <a:lumOff val="40000"/>
+              </a:schemeClr>
+            </a:solidFill>
+            <a:prstDash val="dashDot"/>
+          </a:ln>
+        </p:spPr>
+        <p:style>
+          <a:lnRef idx="2">
+            <a:schemeClr val="accent1"/>
+          </a:lnRef>
+          <a:fillRef idx="0">
+            <a:schemeClr val="accent1"/>
+          </a:fillRef>
+          <a:effectRef idx="1">
+            <a:schemeClr val="accent1"/>
+          </a:effectRef>
+          <a:fontRef idx="minor">
+            <a:schemeClr val="tx1"/>
+          </a:fontRef>
+        </p:style>
+      </p:cxnSp>
+      <p:sp>
+        <p:nvSpPr>
+          <p:cNvPr id="15" name="TextBox 14">
+            <a:extLst>
+              <a:ext uri="{FF2B5EF4-FFF2-40B4-BE49-F238E27FC236}">
+                <a16:creationId xmlns:a16="http://schemas.microsoft.com/office/drawing/2014/main" id="{16E29BEF-E27F-40E0-35F9-6A40445A09BC}"/>
+              </a:ext>
+            </a:extLst>
+          </p:cNvPr>
+          <p:cNvSpPr txBox="1"/>
+          <p:nvPr/>
+        </p:nvSpPr>
+        <p:spPr>
+          <a:xfrm>
+            <a:off x="2260668" y="3689283"/>
+            <a:ext cx="2044878" cy="646331"/>
+          </a:xfrm>
+          <a:prstGeom prst="rect">
+            <a:avLst/>
+          </a:prstGeom>
+          <a:noFill/>
+          <a:ln w="3175">
+            <a:noFill/>
+          </a:ln>
+        </p:spPr>
+        <p:txBody>
+          <a:bodyPr wrap="square" rtlCol="0">
+            <a:spAutoFit/>
+          </a:bodyPr>
+          <a:lstStyle/>
+          <a:p>
+            <a:pPr algn="r"/>
+            <a:r>
+              <a:rPr lang="en-GB" dirty="0">
+                <a:solidFill>
+                  <a:schemeClr val="bg1"/>
+                </a:solidFill>
+              </a:rPr>
+              <a:t>Bridge Phase</a:t>
+            </a:r>
+            <a:br>
+              <a:rPr lang="en-GB" dirty="0">
+                <a:solidFill>
+                  <a:schemeClr val="bg1"/>
+                </a:solidFill>
+              </a:rPr>
+            </a:br>
+            <a:r>
+              <a:rPr lang="en-GB" dirty="0">
+                <a:solidFill>
+                  <a:schemeClr val="bg1"/>
+                </a:solidFill>
+              </a:rPr>
+              <a:t>180 – 360 degrees</a:t>
+            </a:r>
+            <a:endParaRPr lang="en-US" dirty="0">
+              <a:solidFill>
+                <a:schemeClr val="bg1"/>
+              </a:solidFill>
+            </a:endParaRPr>
+          </a:p>
+        </p:txBody>
+      </p:sp>
+      <p:cxnSp>
+        <p:nvCxnSpPr>
+          <p:cNvPr id="17" name="Straight Arrow Connector 16">
+            <a:extLst>
+              <a:ext uri="{FF2B5EF4-FFF2-40B4-BE49-F238E27FC236}">
+                <a16:creationId xmlns:a16="http://schemas.microsoft.com/office/drawing/2014/main" id="{10363C57-CFF5-5E8A-CB66-3001795969C3}"/>
+              </a:ext>
+            </a:extLst>
+          </p:cNvPr>
+          <p:cNvCxnSpPr/>
+          <p:nvPr/>
+        </p:nvCxnSpPr>
+        <p:spPr>
+          <a:xfrm>
+            <a:off x="4305106" y="4109098"/>
+            <a:ext cx="226364" cy="73399"/>
+          </a:xfrm>
+          <a:prstGeom prst="straightConnector1">
+            <a:avLst/>
+          </a:prstGeom>
+          <a:ln w="38100">
+            <a:tailEnd type="triangle"/>
+          </a:ln>
+        </p:spPr>
+        <p:style>
+          <a:lnRef idx="2">
+            <a:schemeClr val="accent1"/>
+          </a:lnRef>
+          <a:fillRef idx="0">
+            <a:schemeClr val="accent1"/>
+          </a:fillRef>
+          <a:effectRef idx="1">
+            <a:schemeClr val="accent1"/>
+          </a:effectRef>
+          <a:fontRef idx="minor">
+            <a:schemeClr val="tx1"/>
+          </a:fontRef>
+        </p:style>
+      </p:cxnSp>
+      <p:cxnSp>
+        <p:nvCxnSpPr>
+          <p:cNvPr id="19" name="Straight Arrow Connector 18">
+            <a:extLst>
+              <a:ext uri="{FF2B5EF4-FFF2-40B4-BE49-F238E27FC236}">
+                <a16:creationId xmlns:a16="http://schemas.microsoft.com/office/drawing/2014/main" id="{63BB1BD0-B1A9-CB0B-B771-7D7CDB7858A6}"/>
+              </a:ext>
+            </a:extLst>
+          </p:cNvPr>
+          <p:cNvCxnSpPr>
+            <a:cxnSpLocks/>
+          </p:cNvCxnSpPr>
+          <p:nvPr/>
+        </p:nvCxnSpPr>
+        <p:spPr>
+          <a:xfrm>
+            <a:off x="4321276" y="3952605"/>
+            <a:ext cx="978313" cy="184666"/>
+          </a:xfrm>
+          <a:prstGeom prst="straightConnector1">
+            <a:avLst/>
+          </a:prstGeom>
+          <a:ln w="38100">
+            <a:tailEnd type="triangle"/>
+          </a:ln>
+        </p:spPr>
+        <p:style>
+          <a:lnRef idx="2">
+            <a:schemeClr val="accent1"/>
+          </a:lnRef>
+          <a:fillRef idx="0">
+            <a:schemeClr val="accent1"/>
+          </a:fillRef>
+          <a:effectRef idx="1">
+            <a:schemeClr val="accent1"/>
+          </a:effectRef>
+          <a:fontRef idx="minor">
+            <a:schemeClr val="tx1"/>
+          </a:fontRef>
+        </p:style>
+      </p:cxnSp>
+      <p:cxnSp>
+        <p:nvCxnSpPr>
+          <p:cNvPr id="20" name="Straight Connector 19">
+            <a:extLst>
+              <a:ext uri="{FF2B5EF4-FFF2-40B4-BE49-F238E27FC236}">
+                <a16:creationId xmlns:a16="http://schemas.microsoft.com/office/drawing/2014/main" id="{4BF660CE-7AF2-6B89-ADAF-B170FE02CF5D}"/>
+              </a:ext>
+            </a:extLst>
+          </p:cNvPr>
+          <p:cNvCxnSpPr>
+            <a:cxnSpLocks/>
+          </p:cNvCxnSpPr>
+          <p:nvPr/>
+        </p:nvCxnSpPr>
+        <p:spPr>
+          <a:xfrm>
+            <a:off x="6059621" y="1583681"/>
+            <a:ext cx="0" cy="3155467"/>
+          </a:xfrm>
+          <a:prstGeom prst="line">
+            <a:avLst/>
+          </a:prstGeom>
+          <a:ln>
+            <a:solidFill>
+              <a:schemeClr val="accent5">
+                <a:lumMod val="60000"/>
+                <a:lumOff val="40000"/>
+              </a:schemeClr>
+            </a:solidFill>
+            <a:prstDash val="dashDot"/>
+          </a:ln>
+        </p:spPr>
+        <p:style>
+          <a:lnRef idx="2">
+            <a:schemeClr val="accent1"/>
+          </a:lnRef>
+          <a:fillRef idx="0">
+            <a:schemeClr val="accent1"/>
+          </a:fillRef>
+          <a:effectRef idx="1">
+            <a:schemeClr val="accent1"/>
+          </a:effectRef>
+          <a:fontRef idx="minor">
+            <a:schemeClr val="tx1"/>
+          </a:fontRef>
+        </p:style>
+      </p:cxnSp>
+      <p:cxnSp>
+        <p:nvCxnSpPr>
+          <p:cNvPr id="21" name="Straight Connector 20">
+            <a:extLst>
+              <a:ext uri="{FF2B5EF4-FFF2-40B4-BE49-F238E27FC236}">
+                <a16:creationId xmlns:a16="http://schemas.microsoft.com/office/drawing/2014/main" id="{22CC68B8-3614-83E7-BA76-3AAF5543D3EB}"/>
+              </a:ext>
+            </a:extLst>
+          </p:cNvPr>
+          <p:cNvCxnSpPr>
+            <a:cxnSpLocks/>
+          </p:cNvCxnSpPr>
+          <p:nvPr/>
+        </p:nvCxnSpPr>
+        <p:spPr>
+          <a:xfrm>
+            <a:off x="6841041" y="1677089"/>
+            <a:ext cx="0" cy="3243739"/>
+          </a:xfrm>
+          <a:prstGeom prst="line">
+            <a:avLst/>
+          </a:prstGeom>
+          <a:ln>
+            <a:solidFill>
+              <a:schemeClr val="accent5">
+                <a:lumMod val="60000"/>
+                <a:lumOff val="40000"/>
+              </a:schemeClr>
+            </a:solidFill>
+            <a:prstDash val="dashDot"/>
+          </a:ln>
+        </p:spPr>
+        <p:style>
+          <a:lnRef idx="2">
+            <a:schemeClr val="accent1"/>
+          </a:lnRef>
+          <a:fillRef idx="0">
+            <a:schemeClr val="accent1"/>
+          </a:fillRef>
+          <a:effectRef idx="1">
+            <a:schemeClr val="accent1"/>
+          </a:effectRef>
+          <a:fontRef idx="minor">
+            <a:schemeClr val="tx1"/>
+          </a:fontRef>
+        </p:style>
+      </p:cxnSp>
+      <p:cxnSp>
+        <p:nvCxnSpPr>
+          <p:cNvPr id="22" name="Straight Connector 21">
+            <a:extLst>
+              <a:ext uri="{FF2B5EF4-FFF2-40B4-BE49-F238E27FC236}">
+                <a16:creationId xmlns:a16="http://schemas.microsoft.com/office/drawing/2014/main" id="{787086A5-8D42-4122-3721-B94297D89946}"/>
+              </a:ext>
+            </a:extLst>
+          </p:cNvPr>
+          <p:cNvCxnSpPr>
+            <a:cxnSpLocks/>
+          </p:cNvCxnSpPr>
+          <p:nvPr/>
+        </p:nvCxnSpPr>
+        <p:spPr>
+          <a:xfrm>
+            <a:off x="7705541" y="2783567"/>
+            <a:ext cx="0" cy="3393396"/>
+          </a:xfrm>
+          <a:prstGeom prst="line">
+            <a:avLst/>
+          </a:prstGeom>
+          <a:ln>
+            <a:solidFill>
+              <a:schemeClr val="accent6">
+                <a:lumMod val="75000"/>
+              </a:schemeClr>
+            </a:solidFill>
+            <a:prstDash val="dashDot"/>
+          </a:ln>
+        </p:spPr>
+        <p:style>
+          <a:lnRef idx="2">
+            <a:schemeClr val="accent1"/>
+          </a:lnRef>
+          <a:fillRef idx="0">
+            <a:schemeClr val="accent1"/>
+          </a:fillRef>
+          <a:effectRef idx="1">
+            <a:schemeClr val="accent1"/>
+          </a:effectRef>
+          <a:fontRef idx="minor">
+            <a:schemeClr val="tx1"/>
+          </a:fontRef>
+        </p:style>
+      </p:cxnSp>
+      <p:cxnSp>
+        <p:nvCxnSpPr>
+          <p:cNvPr id="23" name="Straight Connector 22">
+            <a:extLst>
+              <a:ext uri="{FF2B5EF4-FFF2-40B4-BE49-F238E27FC236}">
+                <a16:creationId xmlns:a16="http://schemas.microsoft.com/office/drawing/2014/main" id="{45406058-5729-C8FA-C2E8-78C1736B7226}"/>
+              </a:ext>
+            </a:extLst>
+          </p:cNvPr>
+          <p:cNvCxnSpPr>
+            <a:cxnSpLocks/>
+          </p:cNvCxnSpPr>
+          <p:nvPr/>
+        </p:nvCxnSpPr>
+        <p:spPr>
+          <a:xfrm>
+            <a:off x="8486961" y="2684206"/>
+            <a:ext cx="0" cy="3492757"/>
+          </a:xfrm>
+          <a:prstGeom prst="line">
+            <a:avLst/>
+          </a:prstGeom>
+          <a:ln>
+            <a:solidFill>
+              <a:schemeClr val="accent6">
+                <a:lumMod val="75000"/>
+              </a:schemeClr>
+            </a:solidFill>
+            <a:prstDash val="dashDot"/>
+          </a:ln>
+        </p:spPr>
+        <p:style>
+          <a:lnRef idx="2">
+            <a:schemeClr val="accent1"/>
+          </a:lnRef>
+          <a:fillRef idx="0">
+            <a:schemeClr val="accent1"/>
+          </a:fillRef>
+          <a:effectRef idx="1">
+            <a:schemeClr val="accent1"/>
+          </a:effectRef>
+          <a:fontRef idx="minor">
+            <a:schemeClr val="tx1"/>
+          </a:fontRef>
+        </p:style>
+      </p:cxnSp>
+      <p:sp>
+        <p:nvSpPr>
+          <p:cNvPr id="39" name="TextBox 38">
+            <a:extLst>
+              <a:ext uri="{FF2B5EF4-FFF2-40B4-BE49-F238E27FC236}">
+                <a16:creationId xmlns:a16="http://schemas.microsoft.com/office/drawing/2014/main" id="{BBFA4EFB-6EEC-E986-3462-8A309477193C}"/>
+              </a:ext>
+            </a:extLst>
+          </p:cNvPr>
+          <p:cNvSpPr txBox="1"/>
+          <p:nvPr/>
+        </p:nvSpPr>
+        <p:spPr>
+          <a:xfrm>
+            <a:off x="7554750" y="1784576"/>
+            <a:ext cx="2625709" cy="646331"/>
+          </a:xfrm>
+          <a:prstGeom prst="rect">
+            <a:avLst/>
+          </a:prstGeom>
+          <a:noFill/>
+          <a:ln w="3175">
+            <a:noFill/>
+          </a:ln>
+        </p:spPr>
+        <p:txBody>
+          <a:bodyPr wrap="square" rtlCol="0">
+            <a:spAutoFit/>
+          </a:bodyPr>
+          <a:lstStyle/>
+          <a:p>
+            <a:r>
+              <a:rPr lang="en-GB" dirty="0" err="1">
+                <a:solidFill>
+                  <a:schemeClr val="bg1"/>
+                </a:solidFill>
+              </a:rPr>
+              <a:t>PRItoSEC</a:t>
+            </a:r>
+            <a:r>
+              <a:rPr lang="en-GB" dirty="0">
+                <a:solidFill>
+                  <a:schemeClr val="bg1"/>
+                </a:solidFill>
+              </a:rPr>
+              <a:t> Phase</a:t>
+            </a:r>
+            <a:br>
+              <a:rPr lang="en-GB" dirty="0">
+                <a:solidFill>
+                  <a:schemeClr val="bg1"/>
+                </a:solidFill>
+              </a:rPr>
+            </a:br>
+            <a:r>
+              <a:rPr lang="en-GB" dirty="0">
+                <a:solidFill>
+                  <a:schemeClr val="bg1"/>
+                </a:solidFill>
+              </a:rPr>
+              <a:t>90 – (Bridge Phase / 2)</a:t>
+            </a:r>
+            <a:endParaRPr lang="en-US" dirty="0">
+              <a:solidFill>
+                <a:schemeClr val="bg1"/>
+              </a:solidFill>
+            </a:endParaRPr>
+          </a:p>
+        </p:txBody>
+      </p:sp>
+      <p:cxnSp>
+        <p:nvCxnSpPr>
+          <p:cNvPr id="41" name="Straight Arrow Connector 40">
+            <a:extLst>
+              <a:ext uri="{FF2B5EF4-FFF2-40B4-BE49-F238E27FC236}">
+                <a16:creationId xmlns:a16="http://schemas.microsoft.com/office/drawing/2014/main" id="{2A4F3B22-898B-E88A-36BE-9E357A1AB372}"/>
+              </a:ext>
+            </a:extLst>
+          </p:cNvPr>
+          <p:cNvCxnSpPr/>
+          <p:nvPr/>
+        </p:nvCxnSpPr>
+        <p:spPr>
+          <a:xfrm flipH="1">
+            <a:off x="6607277" y="2430907"/>
+            <a:ext cx="1268362" cy="164809"/>
+          </a:xfrm>
+          <a:prstGeom prst="straightConnector1">
+            <a:avLst/>
+          </a:prstGeom>
+          <a:ln w="38100">
+            <a:tailEnd type="triangle"/>
+          </a:ln>
+        </p:spPr>
+        <p:style>
+          <a:lnRef idx="2">
+            <a:schemeClr val="accent1"/>
+          </a:lnRef>
+          <a:fillRef idx="0">
+            <a:schemeClr val="accent1"/>
+          </a:fillRef>
+          <a:effectRef idx="1">
+            <a:schemeClr val="accent1"/>
+          </a:effectRef>
+          <a:fontRef idx="minor">
+            <a:schemeClr val="tx1"/>
+          </a:fontRef>
+        </p:style>
+      </p:cxnSp>
+      <p:cxnSp>
+        <p:nvCxnSpPr>
+          <p:cNvPr id="43" name="Straight Arrow Connector 42">
+            <a:extLst>
+              <a:ext uri="{FF2B5EF4-FFF2-40B4-BE49-F238E27FC236}">
+                <a16:creationId xmlns:a16="http://schemas.microsoft.com/office/drawing/2014/main" id="{D85FE6A7-B5F5-6A7D-136E-1E374273EF8E}"/>
+              </a:ext>
+            </a:extLst>
+          </p:cNvPr>
+          <p:cNvCxnSpPr/>
+          <p:nvPr/>
+        </p:nvCxnSpPr>
+        <p:spPr>
+          <a:xfrm>
+            <a:off x="8003458" y="2430907"/>
+            <a:ext cx="0" cy="868051"/>
+          </a:xfrm>
+          <a:prstGeom prst="straightConnector1">
+            <a:avLst/>
+          </a:prstGeom>
+          <a:ln w="38100">
+            <a:tailEnd type="triangle"/>
+          </a:ln>
+        </p:spPr>
+        <p:style>
+          <a:lnRef idx="2">
+            <a:schemeClr val="accent1"/>
+          </a:lnRef>
+          <a:fillRef idx="0">
+            <a:schemeClr val="accent1"/>
+          </a:fillRef>
+          <a:effectRef idx="1">
+            <a:schemeClr val="accent1"/>
+          </a:effectRef>
+          <a:fontRef idx="minor">
+            <a:schemeClr val="tx1"/>
+          </a:fontRef>
+        </p:style>
+      </p:cxnSp>
     </p:spTree>
     <p:extLst>
       <p:ext uri="{BB962C8B-B14F-4D97-AF65-F5344CB8AC3E}">
-        <p14:creationId xmlns:p14="http://schemas.microsoft.com/office/powerpoint/2010/main" val="3737889217"/>
+        <p14:creationId xmlns:p14="http://schemas.microsoft.com/office/powerpoint/2010/main" val="2031767320"/>
       </p:ext>
     </p:extLst>
   </p:cSld>
@@ -3537,7 +4367,7 @@
           <p:cNvPr id="2" name="Title 1">
             <a:extLst>
               <a:ext uri="{FF2B5EF4-FFF2-40B4-BE49-F238E27FC236}">
-                <a16:creationId xmlns:a16="http://schemas.microsoft.com/office/drawing/2014/main" id="{0EAE9B74-133A-E329-7DCD-3D6402887877}"/>
+                <a16:creationId xmlns:a16="http://schemas.microsoft.com/office/drawing/2014/main" id="{00F9370F-13F3-C71D-5AFA-21BEF0A0B1D2}"/>
               </a:ext>
             </a:extLst>
           </p:cNvPr>
@@ -3554,95 +4384,77 @@
           <a:lstStyle/>
           <a:p>
             <a:r>
-              <a:rPr lang="en-GB" dirty="0" err="1"/>
-              <a:t>Lorant’s</a:t>
-            </a:r>
-            <a:r>
               <a:rPr lang="en-GB" dirty="0"/>
-              <a:t> implementation</a:t>
+              <a:t>MCC PWM1</a:t>
             </a:r>
             <a:endParaRPr lang="en-US" dirty="0"/>
           </a:p>
         </p:txBody>
       </p:sp>
-      <p:sp>
-        <p:nvSpPr>
-          <p:cNvPr id="3" name="Content Placeholder 2">
-            <a:extLst>
-              <a:ext uri="{FF2B5EF4-FFF2-40B4-BE49-F238E27FC236}">
-                <a16:creationId xmlns:a16="http://schemas.microsoft.com/office/drawing/2014/main" id="{175628AF-A6E0-617A-0769-FEC14E78591B}"/>
-              </a:ext>
-            </a:extLst>
-          </p:cNvPr>
-          <p:cNvSpPr>
-            <a:spLocks noGrp="1"/>
-          </p:cNvSpPr>
-          <p:nvPr>
-            <p:ph idx="1"/>
-          </p:nvPr>
-        </p:nvSpPr>
-        <p:spPr/>
-        <p:txBody>
-          <a:bodyPr/>
-          <a:lstStyle/>
-          <a:p>
-            <a:r>
-              <a:rPr lang="en-GB" dirty="0"/>
-              <a:t>Pros</a:t>
-            </a:r>
-          </a:p>
-          <a:p>
-            <a:pPr lvl="1"/>
-            <a:r>
-              <a:rPr lang="en-GB" dirty="0"/>
-              <a:t>Direct write to </a:t>
-            </a:r>
-            <a:r>
-              <a:rPr lang="en-GB" dirty="0" err="1"/>
-              <a:t>TRIGx</a:t>
-            </a:r>
-            <a:r>
-              <a:rPr lang="en-GB" dirty="0"/>
-              <a:t> value for the phase </a:t>
-            </a:r>
-          </a:p>
-          <a:p>
-            <a:pPr lvl="1"/>
-            <a:r>
-              <a:rPr lang="en-GB" dirty="0"/>
-              <a:t>Freedom to change the PWM phase whatever you define in it</a:t>
-            </a:r>
-          </a:p>
-          <a:p>
-            <a:r>
-              <a:rPr lang="en-GB" dirty="0"/>
-              <a:t>Cons</a:t>
-            </a:r>
-          </a:p>
-          <a:p>
-            <a:pPr lvl="1"/>
-            <a:r>
-              <a:rPr lang="en-GB" dirty="0"/>
-              <a:t>User need to manually initialize the PWM Event for the primary secondary phase (PWM1, 2)</a:t>
-            </a:r>
-          </a:p>
-          <a:p>
-            <a:pPr lvl="1"/>
-            <a:r>
-              <a:rPr lang="en-GB" dirty="0"/>
-              <a:t>Two update bits needs to be set (need to make sure that all PWMs are updated in the same cycle, otherwise it will be one instruction late for the other)</a:t>
-            </a:r>
-          </a:p>
-          <a:p>
-            <a:pPr lvl="1"/>
-            <a:endParaRPr lang="en-US" dirty="0"/>
-          </a:p>
-        </p:txBody>
-      </p:sp>
+      <p:pic>
+        <p:nvPicPr>
+          <p:cNvPr id="5" name="Picture 4">
+            <a:extLst>
+              <a:ext uri="{FF2B5EF4-FFF2-40B4-BE49-F238E27FC236}">
+                <a16:creationId xmlns:a16="http://schemas.microsoft.com/office/drawing/2014/main" id="{E4845D41-AABA-FCF6-7BC2-B541699A7D6E}"/>
+              </a:ext>
+            </a:extLst>
+          </p:cNvPr>
+          <p:cNvPicPr>
+            <a:picLocks noChangeAspect="1"/>
+          </p:cNvPicPr>
+          <p:nvPr/>
+        </p:nvPicPr>
+        <p:blipFill>
+          <a:blip r:embed="rId2"/>
+          <a:stretch>
+            <a:fillRect/>
+          </a:stretch>
+        </p:blipFill>
+        <p:spPr>
+          <a:xfrm>
+            <a:off x="838200" y="1964849"/>
+            <a:ext cx="5326926" cy="4072890"/>
+          </a:xfrm>
+          <a:prstGeom prst="rect">
+            <a:avLst/>
+          </a:prstGeom>
+        </p:spPr>
+      </p:pic>
+      <p:pic>
+        <p:nvPicPr>
+          <p:cNvPr id="7" name="Picture 6">
+            <a:extLst>
+              <a:ext uri="{FF2B5EF4-FFF2-40B4-BE49-F238E27FC236}">
+                <a16:creationId xmlns:a16="http://schemas.microsoft.com/office/drawing/2014/main" id="{A352271E-AACB-4671-5AB5-0E4B8EB3C302}"/>
+              </a:ext>
+            </a:extLst>
+          </p:cNvPr>
+          <p:cNvPicPr>
+            <a:picLocks noChangeAspect="1"/>
+          </p:cNvPicPr>
+          <p:nvPr/>
+        </p:nvPicPr>
+        <p:blipFill>
+          <a:blip r:embed="rId3"/>
+          <a:stretch>
+            <a:fillRect/>
+          </a:stretch>
+        </p:blipFill>
+        <p:spPr>
+          <a:xfrm>
+            <a:off x="6267008" y="2308978"/>
+            <a:ext cx="4984910" cy="3108596"/>
+          </a:xfrm>
+          <a:prstGeom prst="rect">
+            <a:avLst/>
+          </a:prstGeom>
+        </p:spPr>
+      </p:pic>
     </p:spTree>
     <p:extLst>
       <p:ext uri="{BB962C8B-B14F-4D97-AF65-F5344CB8AC3E}">
-        <p14:creationId xmlns:p14="http://schemas.microsoft.com/office/powerpoint/2010/main" val="1093863890"/>
+        <p14:creationId xmlns:p14="http://schemas.microsoft.com/office/powerpoint/2010/main" val="267813271"/>
       </p:ext>
     </p:extLst>
   </p:cSld>
@@ -3674,7 +4486,7 @@
           <p:cNvPr id="2" name="Title 1">
             <a:extLst>
               <a:ext uri="{FF2B5EF4-FFF2-40B4-BE49-F238E27FC236}">
-                <a16:creationId xmlns:a16="http://schemas.microsoft.com/office/drawing/2014/main" id="{2AC66917-3F56-DE41-0CE0-280DEB785CD7}"/>
+                <a16:creationId xmlns:a16="http://schemas.microsoft.com/office/drawing/2014/main" id="{05617F05-033B-B906-5621-EA673C925AEB}"/>
               </a:ext>
             </a:extLst>
           </p:cNvPr>
@@ -3685,25 +4497,41 @@
             <p:ph type="title"/>
           </p:nvPr>
         </p:nvSpPr>
-        <p:spPr>
-          <a:xfrm>
-            <a:off x="0" y="-375103"/>
-            <a:ext cx="10515600" cy="1325563"/>
-          </a:xfrm>
-        </p:spPr>
-        <p:txBody>
-          <a:bodyPr/>
-          <a:lstStyle/>
-          <a:p>
-            <a:r>
-              <a:rPr lang="en-GB" dirty="0" err="1"/>
-              <a:t>Lorant’s</a:t>
-            </a:r>
+        <p:spPr/>
+        <p:txBody>
+          <a:bodyPr/>
+          <a:lstStyle/>
+          <a:p>
             <a:r>
               <a:rPr lang="en-GB" dirty="0"/>
-              <a:t> implementation</a:t>
+              <a:t>MCC PWM2</a:t>
             </a:r>
             <a:endParaRPr lang="en-US" dirty="0"/>
+          </a:p>
+        </p:txBody>
+      </p:sp>
+      <p:sp>
+        <p:nvSpPr>
+          <p:cNvPr id="3" name="Content Placeholder 2">
+            <a:extLst>
+              <a:ext uri="{FF2B5EF4-FFF2-40B4-BE49-F238E27FC236}">
+                <a16:creationId xmlns:a16="http://schemas.microsoft.com/office/drawing/2014/main" id="{5E534D3A-1EEB-3048-0F83-EDB261A682BF}"/>
+              </a:ext>
+            </a:extLst>
+          </p:cNvPr>
+          <p:cNvSpPr>
+            <a:spLocks noGrp="1"/>
+          </p:cNvSpPr>
+          <p:nvPr>
+            <p:ph idx="1"/>
+          </p:nvPr>
+        </p:nvSpPr>
+        <p:spPr/>
+        <p:txBody>
+          <a:bodyPr/>
+          <a:lstStyle/>
+          <a:p>
+            <a:endParaRPr lang="en-US"/>
           </a:p>
         </p:txBody>
       </p:sp>
@@ -3712,7 +4540,7 @@
           <p:cNvPr id="5" name="Picture 4">
             <a:extLst>
               <a:ext uri="{FF2B5EF4-FFF2-40B4-BE49-F238E27FC236}">
-                <a16:creationId xmlns:a16="http://schemas.microsoft.com/office/drawing/2014/main" id="{B3292BEB-1D0B-DB43-70AE-2D9E58D9FA82}"/>
+                <a16:creationId xmlns:a16="http://schemas.microsoft.com/office/drawing/2014/main" id="{65CF3B1E-FE84-E0D9-05D8-EB02A7FCD626}"/>
               </a:ext>
             </a:extLst>
           </p:cNvPr>
@@ -3729,676 +4557,286 @@
         </p:blipFill>
         <p:spPr>
           <a:xfrm>
-            <a:off x="846656" y="700201"/>
-            <a:ext cx="10498688" cy="6157799"/>
+            <a:off x="838200" y="1586307"/>
+            <a:ext cx="5075187" cy="3841099"/>
           </a:xfrm>
           <a:prstGeom prst="rect">
             <a:avLst/>
           </a:prstGeom>
         </p:spPr>
       </p:pic>
-      <p:cxnSp>
-        <p:nvCxnSpPr>
-          <p:cNvPr id="7" name="Straight Connector 6">
-            <a:extLst>
-              <a:ext uri="{FF2B5EF4-FFF2-40B4-BE49-F238E27FC236}">
-                <a16:creationId xmlns:a16="http://schemas.microsoft.com/office/drawing/2014/main" id="{BCE4B33F-67FC-8670-DBFD-B20BAE7E3C0A}"/>
-              </a:ext>
-            </a:extLst>
-          </p:cNvPr>
-          <p:cNvCxnSpPr/>
+      <p:pic>
+        <p:nvPicPr>
+          <p:cNvPr id="7" name="Picture 6">
+            <a:extLst>
+              <a:ext uri="{FF2B5EF4-FFF2-40B4-BE49-F238E27FC236}">
+                <a16:creationId xmlns:a16="http://schemas.microsoft.com/office/drawing/2014/main" id="{D2153B4D-7038-B21D-5A5C-926B0B3AC7AE}"/>
+              </a:ext>
+            </a:extLst>
+          </p:cNvPr>
+          <p:cNvPicPr>
+            <a:picLocks noChangeAspect="1"/>
+          </p:cNvPicPr>
           <p:nvPr/>
-        </p:nvCxnSpPr>
+        </p:nvPicPr>
+        <p:blipFill>
+          <a:blip r:embed="rId3"/>
+          <a:stretch>
+            <a:fillRect/>
+          </a:stretch>
+        </p:blipFill>
         <p:spPr>
           <a:xfrm>
-            <a:off x="2525486" y="700089"/>
-            <a:ext cx="0" cy="5570083"/>
-          </a:xfrm>
-          <a:prstGeom prst="line">
-            <a:avLst/>
-          </a:prstGeom>
-          <a:ln>
-            <a:solidFill>
-              <a:schemeClr val="bg1"/>
-            </a:solidFill>
-            <a:prstDash val="sysDash"/>
-          </a:ln>
-        </p:spPr>
-        <p:style>
-          <a:lnRef idx="2">
-            <a:schemeClr val="accent1"/>
-          </a:lnRef>
-          <a:fillRef idx="0">
-            <a:schemeClr val="accent1"/>
-          </a:fillRef>
-          <a:effectRef idx="1">
-            <a:schemeClr val="accent1"/>
-          </a:effectRef>
-          <a:fontRef idx="minor">
-            <a:schemeClr val="tx1"/>
-          </a:fontRef>
-        </p:style>
-      </p:cxnSp>
-      <p:cxnSp>
-        <p:nvCxnSpPr>
-          <p:cNvPr id="8" name="Straight Connector 7">
-            <a:extLst>
-              <a:ext uri="{FF2B5EF4-FFF2-40B4-BE49-F238E27FC236}">
-                <a16:creationId xmlns:a16="http://schemas.microsoft.com/office/drawing/2014/main" id="{04680757-DFD7-F48F-E8E0-F97F93B723CB}"/>
-              </a:ext>
-            </a:extLst>
-          </p:cNvPr>
-          <p:cNvCxnSpPr/>
-          <p:nvPr/>
-        </p:nvCxnSpPr>
-        <p:spPr>
-          <a:xfrm>
-            <a:off x="2993572" y="700089"/>
-            <a:ext cx="0" cy="5570083"/>
-          </a:xfrm>
-          <a:prstGeom prst="line">
-            <a:avLst/>
-          </a:prstGeom>
-          <a:ln>
-            <a:solidFill>
-              <a:schemeClr val="bg1"/>
-            </a:solidFill>
-            <a:prstDash val="sysDash"/>
-          </a:ln>
-        </p:spPr>
-        <p:style>
-          <a:lnRef idx="2">
-            <a:schemeClr val="accent1"/>
-          </a:lnRef>
-          <a:fillRef idx="0">
-            <a:schemeClr val="accent1"/>
-          </a:fillRef>
-          <a:effectRef idx="1">
-            <a:schemeClr val="accent1"/>
-          </a:effectRef>
-          <a:fontRef idx="minor">
-            <a:schemeClr val="tx1"/>
-          </a:fontRef>
-        </p:style>
-      </p:cxnSp>
-      <p:cxnSp>
-        <p:nvCxnSpPr>
-          <p:cNvPr id="9" name="Straight Connector 8">
-            <a:extLst>
-              <a:ext uri="{FF2B5EF4-FFF2-40B4-BE49-F238E27FC236}">
-                <a16:creationId xmlns:a16="http://schemas.microsoft.com/office/drawing/2014/main" id="{4DEF27AB-62FB-97F0-FE17-2BE098481567}"/>
-              </a:ext>
-            </a:extLst>
-          </p:cNvPr>
-          <p:cNvCxnSpPr/>
-          <p:nvPr/>
-        </p:nvCxnSpPr>
-        <p:spPr>
-          <a:xfrm>
-            <a:off x="3276601" y="700089"/>
-            <a:ext cx="0" cy="5570083"/>
-          </a:xfrm>
-          <a:prstGeom prst="line">
-            <a:avLst/>
-          </a:prstGeom>
-          <a:ln>
-            <a:solidFill>
-              <a:schemeClr val="bg1"/>
-            </a:solidFill>
-            <a:prstDash val="sysDash"/>
-          </a:ln>
-        </p:spPr>
-        <p:style>
-          <a:lnRef idx="2">
-            <a:schemeClr val="accent1"/>
-          </a:lnRef>
-          <a:fillRef idx="0">
-            <a:schemeClr val="accent1"/>
-          </a:fillRef>
-          <a:effectRef idx="1">
-            <a:schemeClr val="accent1"/>
-          </a:effectRef>
-          <a:fontRef idx="minor">
-            <a:schemeClr val="tx1"/>
-          </a:fontRef>
-        </p:style>
-      </p:cxnSp>
-      <p:cxnSp>
-        <p:nvCxnSpPr>
-          <p:cNvPr id="10" name="Straight Connector 9">
-            <a:extLst>
-              <a:ext uri="{FF2B5EF4-FFF2-40B4-BE49-F238E27FC236}">
-                <a16:creationId xmlns:a16="http://schemas.microsoft.com/office/drawing/2014/main" id="{9B76286A-0185-EF04-DBD9-9C3074404254}"/>
-              </a:ext>
-            </a:extLst>
-          </p:cNvPr>
-          <p:cNvCxnSpPr/>
-          <p:nvPr/>
-        </p:nvCxnSpPr>
-        <p:spPr>
-          <a:xfrm>
-            <a:off x="3385457" y="667431"/>
-            <a:ext cx="0" cy="5570083"/>
-          </a:xfrm>
-          <a:prstGeom prst="line">
-            <a:avLst/>
-          </a:prstGeom>
-          <a:ln>
-            <a:solidFill>
-              <a:schemeClr val="bg1"/>
-            </a:solidFill>
-            <a:prstDash val="sysDash"/>
-          </a:ln>
-        </p:spPr>
-        <p:style>
-          <a:lnRef idx="2">
-            <a:schemeClr val="accent1"/>
-          </a:lnRef>
-          <a:fillRef idx="0">
-            <a:schemeClr val="accent1"/>
-          </a:fillRef>
-          <a:effectRef idx="1">
-            <a:schemeClr val="accent1"/>
-          </a:effectRef>
-          <a:fontRef idx="minor">
-            <a:schemeClr val="tx1"/>
-          </a:fontRef>
-        </p:style>
-      </p:cxnSp>
-      <p:cxnSp>
-        <p:nvCxnSpPr>
-          <p:cNvPr id="11" name="Straight Connector 10">
-            <a:extLst>
-              <a:ext uri="{FF2B5EF4-FFF2-40B4-BE49-F238E27FC236}">
-                <a16:creationId xmlns:a16="http://schemas.microsoft.com/office/drawing/2014/main" id="{5412CAF5-CE25-2298-7832-C601DADD215D}"/>
-              </a:ext>
-            </a:extLst>
-          </p:cNvPr>
-          <p:cNvCxnSpPr/>
-          <p:nvPr/>
-        </p:nvCxnSpPr>
-        <p:spPr>
-          <a:xfrm>
-            <a:off x="3853543" y="643958"/>
-            <a:ext cx="0" cy="5570083"/>
-          </a:xfrm>
-          <a:prstGeom prst="line">
-            <a:avLst/>
-          </a:prstGeom>
-          <a:ln>
-            <a:solidFill>
-              <a:schemeClr val="bg1"/>
-            </a:solidFill>
-            <a:prstDash val="sysDash"/>
-          </a:ln>
-        </p:spPr>
-        <p:style>
-          <a:lnRef idx="2">
-            <a:schemeClr val="accent1"/>
-          </a:lnRef>
-          <a:fillRef idx="0">
-            <a:schemeClr val="accent1"/>
-          </a:fillRef>
-          <a:effectRef idx="1">
-            <a:schemeClr val="accent1"/>
-          </a:effectRef>
-          <a:fontRef idx="minor">
-            <a:schemeClr val="tx1"/>
-          </a:fontRef>
-        </p:style>
-      </p:cxnSp>
-      <p:sp>
-        <p:nvSpPr>
-          <p:cNvPr id="12" name="TextBox 11">
-            <a:extLst>
-              <a:ext uri="{FF2B5EF4-FFF2-40B4-BE49-F238E27FC236}">
-                <a16:creationId xmlns:a16="http://schemas.microsoft.com/office/drawing/2014/main" id="{91FDF4AB-A956-5582-9649-EE096B387A52}"/>
-              </a:ext>
-            </a:extLst>
-          </p:cNvPr>
-          <p:cNvSpPr txBox="1"/>
-          <p:nvPr/>
-        </p:nvSpPr>
-        <p:spPr>
-          <a:xfrm>
-            <a:off x="5566844" y="1088571"/>
-            <a:ext cx="3379401" cy="523220"/>
+            <a:off x="6037440" y="2063598"/>
+            <a:ext cx="5181166" cy="3207892"/>
           </a:xfrm>
           <a:prstGeom prst="rect">
             <a:avLst/>
           </a:prstGeom>
-          <a:noFill/>
         </p:spPr>
-        <p:txBody>
-          <a:bodyPr wrap="square" rtlCol="0">
-            <a:spAutoFit/>
-          </a:bodyPr>
-          <a:lstStyle/>
-          <a:p>
-            <a:r>
-              <a:rPr lang="en-GB" sz="2800" dirty="0">
-                <a:solidFill>
-                  <a:schemeClr val="bg1"/>
-                </a:solidFill>
-              </a:rPr>
-              <a:t>SOC Self-Trigger</a:t>
-            </a:r>
-            <a:endParaRPr lang="en-US" sz="2800" dirty="0">
-              <a:solidFill>
-                <a:schemeClr val="bg1"/>
-              </a:solidFill>
-            </a:endParaRPr>
-          </a:p>
-        </p:txBody>
-      </p:sp>
-      <p:sp>
-        <p:nvSpPr>
-          <p:cNvPr id="14" name="Oval 13">
-            <a:extLst>
-              <a:ext uri="{FF2B5EF4-FFF2-40B4-BE49-F238E27FC236}">
-                <a16:creationId xmlns:a16="http://schemas.microsoft.com/office/drawing/2014/main" id="{9F277001-F946-E93C-21FD-16D4797BA789}"/>
-              </a:ext>
-            </a:extLst>
-          </p:cNvPr>
-          <p:cNvSpPr/>
+      </p:pic>
+    </p:spTree>
+    <p:extLst>
+      <p:ext uri="{BB962C8B-B14F-4D97-AF65-F5344CB8AC3E}">
+        <p14:creationId xmlns:p14="http://schemas.microsoft.com/office/powerpoint/2010/main" val="2085554015"/>
+      </p:ext>
+    </p:extLst>
+  </p:cSld>
+  <p:clrMapOvr>
+    <a:masterClrMapping/>
+  </p:clrMapOvr>
+</p:sld>
+</file>
+
+<file path=ppt/slides/slide5.xml><?xml version="1.0" encoding="utf-8"?>
+<p:sld xmlns:a="http://schemas.openxmlformats.org/drawingml/2006/main" xmlns:r="http://schemas.openxmlformats.org/officeDocument/2006/relationships" xmlns:p="http://schemas.openxmlformats.org/presentationml/2006/main">
+  <p:cSld>
+    <p:spTree>
+      <p:nvGrpSpPr>
+        <p:cNvPr id="1" name=""/>
+        <p:cNvGrpSpPr/>
+        <p:nvPr/>
+      </p:nvGrpSpPr>
+      <p:grpSpPr>
+        <a:xfrm>
+          <a:off x="0" y="0"/>
+          <a:ext cx="0" cy="0"/>
+          <a:chOff x="0" y="0"/>
+          <a:chExt cx="0" cy="0"/>
+        </a:xfrm>
+      </p:grpSpPr>
+      <p:sp>
+        <p:nvSpPr>
+          <p:cNvPr id="2" name="Title 1">
+            <a:extLst>
+              <a:ext uri="{FF2B5EF4-FFF2-40B4-BE49-F238E27FC236}">
+                <a16:creationId xmlns:a16="http://schemas.microsoft.com/office/drawing/2014/main" id="{FA4CBB73-C701-6D3F-7158-E5FC514168CA}"/>
+              </a:ext>
+            </a:extLst>
+          </p:cNvPr>
+          <p:cNvSpPr>
+            <a:spLocks noGrp="1"/>
+          </p:cNvSpPr>
+          <p:nvPr>
+            <p:ph type="title"/>
+          </p:nvPr>
+        </p:nvSpPr>
+        <p:spPr/>
+        <p:txBody>
+          <a:bodyPr/>
+          <a:lstStyle/>
+          <a:p>
+            <a:r>
+              <a:rPr lang="en-GB" dirty="0"/>
+              <a:t>MCC PWM3</a:t>
+            </a:r>
+            <a:endParaRPr lang="en-US" dirty="0"/>
+          </a:p>
+        </p:txBody>
+      </p:sp>
+      <p:pic>
+        <p:nvPicPr>
+          <p:cNvPr id="5" name="Picture 4">
+            <a:extLst>
+              <a:ext uri="{FF2B5EF4-FFF2-40B4-BE49-F238E27FC236}">
+                <a16:creationId xmlns:a16="http://schemas.microsoft.com/office/drawing/2014/main" id="{4A2FE6B1-46C0-288B-FA49-5F42F05DFBF0}"/>
+              </a:ext>
+            </a:extLst>
+          </p:cNvPr>
+          <p:cNvPicPr>
+            <a:picLocks noChangeAspect="1"/>
+          </p:cNvPicPr>
           <p:nvPr/>
-        </p:nvSpPr>
+        </p:nvPicPr>
+        <p:blipFill>
+          <a:blip r:embed="rId2"/>
+          <a:stretch>
+            <a:fillRect/>
+          </a:stretch>
+        </p:blipFill>
         <p:spPr>
           <a:xfrm>
-            <a:off x="2993572" y="5972742"/>
-            <a:ext cx="337457" cy="370114"/>
-          </a:xfrm>
-          <a:prstGeom prst="ellipse">
-            <a:avLst/>
-          </a:prstGeom>
-          <a:solidFill>
-            <a:schemeClr val="bg1"/>
-          </a:solidFill>
-          <a:ln>
-            <a:noFill/>
-          </a:ln>
-        </p:spPr>
-        <p:style>
-          <a:lnRef idx="2">
-            <a:schemeClr val="accent1">
-              <a:shade val="15000"/>
-            </a:schemeClr>
-          </a:lnRef>
-          <a:fillRef idx="1">
-            <a:schemeClr val="accent1"/>
-          </a:fillRef>
-          <a:effectRef idx="0">
-            <a:schemeClr val="accent1"/>
-          </a:effectRef>
-          <a:fontRef idx="minor">
-            <a:schemeClr val="lt1"/>
-          </a:fontRef>
-        </p:style>
-        <p:txBody>
-          <a:bodyPr rtlCol="0" anchor="ctr"/>
-          <a:lstStyle/>
-          <a:p>
-            <a:pPr algn="ctr"/>
-            <a:r>
-              <a:rPr lang="en-GB" sz="2000" dirty="0">
-                <a:solidFill>
-                  <a:schemeClr val="tx1"/>
-                </a:solidFill>
-              </a:rPr>
-              <a:t>2</a:t>
-            </a:r>
-            <a:endParaRPr lang="en-US" sz="2000" dirty="0">
-              <a:solidFill>
-                <a:schemeClr val="tx1"/>
-              </a:solidFill>
-            </a:endParaRPr>
-          </a:p>
-        </p:txBody>
-      </p:sp>
-      <p:sp>
-        <p:nvSpPr>
-          <p:cNvPr id="15" name="Oval 14">
-            <a:extLst>
-              <a:ext uri="{FF2B5EF4-FFF2-40B4-BE49-F238E27FC236}">
-                <a16:creationId xmlns:a16="http://schemas.microsoft.com/office/drawing/2014/main" id="{BBC11D22-C295-4CD7-8885-511EDFD18BE6}"/>
-              </a:ext>
-            </a:extLst>
-          </p:cNvPr>
-          <p:cNvSpPr/>
-          <p:nvPr/>
-        </p:nvSpPr>
-        <p:spPr>
-          <a:xfrm>
-            <a:off x="2574474" y="5972742"/>
-            <a:ext cx="337457" cy="370114"/>
-          </a:xfrm>
-          <a:prstGeom prst="ellipse">
-            <a:avLst/>
-          </a:prstGeom>
-          <a:solidFill>
-            <a:schemeClr val="bg1"/>
-          </a:solidFill>
-          <a:ln>
-            <a:noFill/>
-          </a:ln>
-        </p:spPr>
-        <p:style>
-          <a:lnRef idx="2">
-            <a:schemeClr val="accent1">
-              <a:shade val="15000"/>
-            </a:schemeClr>
-          </a:lnRef>
-          <a:fillRef idx="1">
-            <a:schemeClr val="accent1"/>
-          </a:fillRef>
-          <a:effectRef idx="0">
-            <a:schemeClr val="accent1"/>
-          </a:effectRef>
-          <a:fontRef idx="minor">
-            <a:schemeClr val="lt1"/>
-          </a:fontRef>
-        </p:style>
-        <p:txBody>
-          <a:bodyPr rtlCol="0" anchor="ctr"/>
-          <a:lstStyle/>
-          <a:p>
-            <a:pPr algn="ctr"/>
-            <a:r>
-              <a:rPr lang="en-GB" sz="2000" dirty="0">
-                <a:solidFill>
-                  <a:schemeClr val="tx1"/>
-                </a:solidFill>
-              </a:rPr>
-              <a:t>1</a:t>
-            </a:r>
-            <a:endParaRPr lang="en-US" sz="2000" dirty="0">
-              <a:solidFill>
-                <a:schemeClr val="tx1"/>
-              </a:solidFill>
-            </a:endParaRPr>
-          </a:p>
-        </p:txBody>
-      </p:sp>
-      <p:sp>
-        <p:nvSpPr>
-          <p:cNvPr id="16" name="Oval 15">
-            <a:extLst>
-              <a:ext uri="{FF2B5EF4-FFF2-40B4-BE49-F238E27FC236}">
-                <a16:creationId xmlns:a16="http://schemas.microsoft.com/office/drawing/2014/main" id="{2B3393B7-DF70-42A7-C385-A5D1398C623C}"/>
-              </a:ext>
-            </a:extLst>
-          </p:cNvPr>
-          <p:cNvSpPr/>
-          <p:nvPr/>
-        </p:nvSpPr>
-        <p:spPr>
-          <a:xfrm>
-            <a:off x="3203414" y="5464799"/>
-            <a:ext cx="337457" cy="370114"/>
-          </a:xfrm>
-          <a:prstGeom prst="ellipse">
-            <a:avLst/>
-          </a:prstGeom>
-          <a:solidFill>
-            <a:schemeClr val="bg1"/>
-          </a:solidFill>
-          <a:ln>
-            <a:noFill/>
-          </a:ln>
-        </p:spPr>
-        <p:style>
-          <a:lnRef idx="2">
-            <a:schemeClr val="accent1">
-              <a:shade val="15000"/>
-            </a:schemeClr>
-          </a:lnRef>
-          <a:fillRef idx="1">
-            <a:schemeClr val="accent1"/>
-          </a:fillRef>
-          <a:effectRef idx="0">
-            <a:schemeClr val="accent1"/>
-          </a:effectRef>
-          <a:fontRef idx="minor">
-            <a:schemeClr val="lt1"/>
-          </a:fontRef>
-        </p:style>
-        <p:txBody>
-          <a:bodyPr rtlCol="0" anchor="ctr"/>
-          <a:lstStyle/>
-          <a:p>
-            <a:pPr algn="ctr"/>
-            <a:r>
-              <a:rPr lang="en-GB" sz="2000" dirty="0">
-                <a:solidFill>
-                  <a:schemeClr val="tx1"/>
-                </a:solidFill>
-              </a:rPr>
-              <a:t>3</a:t>
-            </a:r>
-            <a:endParaRPr lang="en-US" sz="2000" dirty="0">
-              <a:solidFill>
-                <a:schemeClr val="tx1"/>
-              </a:solidFill>
-            </a:endParaRPr>
-          </a:p>
-        </p:txBody>
-      </p:sp>
-      <p:sp>
-        <p:nvSpPr>
-          <p:cNvPr id="17" name="Oval 16">
-            <a:extLst>
-              <a:ext uri="{FF2B5EF4-FFF2-40B4-BE49-F238E27FC236}">
-                <a16:creationId xmlns:a16="http://schemas.microsoft.com/office/drawing/2014/main" id="{D2149852-130B-F5DE-3CD9-EE95ECFD35EF}"/>
-              </a:ext>
-            </a:extLst>
-          </p:cNvPr>
-          <p:cNvSpPr/>
-          <p:nvPr/>
-        </p:nvSpPr>
-        <p:spPr>
-          <a:xfrm>
-            <a:off x="3474972" y="5896374"/>
-            <a:ext cx="337457" cy="370114"/>
-          </a:xfrm>
-          <a:prstGeom prst="ellipse">
-            <a:avLst/>
-          </a:prstGeom>
-          <a:solidFill>
-            <a:schemeClr val="bg1"/>
-          </a:solidFill>
-          <a:ln>
-            <a:noFill/>
-          </a:ln>
-        </p:spPr>
-        <p:style>
-          <a:lnRef idx="2">
-            <a:schemeClr val="accent1">
-              <a:shade val="15000"/>
-            </a:schemeClr>
-          </a:lnRef>
-          <a:fillRef idx="1">
-            <a:schemeClr val="accent1"/>
-          </a:fillRef>
-          <a:effectRef idx="0">
-            <a:schemeClr val="accent1"/>
-          </a:effectRef>
-          <a:fontRef idx="minor">
-            <a:schemeClr val="lt1"/>
-          </a:fontRef>
-        </p:style>
-        <p:txBody>
-          <a:bodyPr rtlCol="0" anchor="ctr"/>
-          <a:lstStyle/>
-          <a:p>
-            <a:pPr algn="ctr"/>
-            <a:r>
-              <a:rPr lang="en-GB" sz="2000" dirty="0">
-                <a:solidFill>
-                  <a:schemeClr val="tx1"/>
-                </a:solidFill>
-              </a:rPr>
-              <a:t>4</a:t>
-            </a:r>
-            <a:endParaRPr lang="en-US" sz="2000" dirty="0">
-              <a:solidFill>
-                <a:schemeClr val="tx1"/>
-              </a:solidFill>
-            </a:endParaRPr>
-          </a:p>
-        </p:txBody>
-      </p:sp>
-      <p:sp>
-        <p:nvSpPr>
-          <p:cNvPr id="18" name="TextBox 17">
-            <a:extLst>
-              <a:ext uri="{FF2B5EF4-FFF2-40B4-BE49-F238E27FC236}">
-                <a16:creationId xmlns:a16="http://schemas.microsoft.com/office/drawing/2014/main" id="{82875FD8-7043-3D2A-62A7-3E55D460B5C7}"/>
-              </a:ext>
-            </a:extLst>
-          </p:cNvPr>
-          <p:cNvSpPr txBox="1"/>
-          <p:nvPr/>
-        </p:nvSpPr>
-        <p:spPr>
-          <a:xfrm>
-            <a:off x="5782747" y="2253342"/>
-            <a:ext cx="5168281" cy="523220"/>
+            <a:off x="838200" y="1825625"/>
+            <a:ext cx="4987039" cy="3760470"/>
           </a:xfrm>
           <a:prstGeom prst="rect">
             <a:avLst/>
           </a:prstGeom>
-          <a:noFill/>
         </p:spPr>
-        <p:txBody>
-          <a:bodyPr wrap="square" rtlCol="0">
-            <a:spAutoFit/>
-          </a:bodyPr>
-          <a:lstStyle/>
-          <a:p>
-            <a:r>
-              <a:rPr lang="en-GB" sz="2800" dirty="0">
-                <a:solidFill>
-                  <a:schemeClr val="bg1"/>
-                </a:solidFill>
-              </a:rPr>
-              <a:t>PCI Sync – </a:t>
-            </a:r>
-            <a:r>
-              <a:rPr lang="en-GB" sz="2800" dirty="0" err="1">
-                <a:solidFill>
-                  <a:schemeClr val="bg1"/>
-                </a:solidFill>
-              </a:rPr>
-              <a:t>PWMEVTx</a:t>
-            </a:r>
-            <a:r>
-              <a:rPr lang="en-GB" sz="2800" dirty="0">
-                <a:solidFill>
-                  <a:schemeClr val="bg1"/>
-                </a:solidFill>
-              </a:rPr>
-              <a:t> event</a:t>
-            </a:r>
-            <a:endParaRPr lang="en-US" sz="2800" dirty="0">
-              <a:solidFill>
-                <a:schemeClr val="bg1"/>
-              </a:solidFill>
-            </a:endParaRPr>
-          </a:p>
-        </p:txBody>
-      </p:sp>
-      <p:sp>
-        <p:nvSpPr>
-          <p:cNvPr id="19" name="TextBox 18">
-            <a:extLst>
-              <a:ext uri="{FF2B5EF4-FFF2-40B4-BE49-F238E27FC236}">
-                <a16:creationId xmlns:a16="http://schemas.microsoft.com/office/drawing/2014/main" id="{54EE154D-0781-B2E9-6D15-64DC86CA07FE}"/>
-              </a:ext>
-            </a:extLst>
-          </p:cNvPr>
-          <p:cNvSpPr txBox="1"/>
+      </p:pic>
+      <p:pic>
+        <p:nvPicPr>
+          <p:cNvPr id="7" name="Picture 6">
+            <a:extLst>
+              <a:ext uri="{FF2B5EF4-FFF2-40B4-BE49-F238E27FC236}">
+                <a16:creationId xmlns:a16="http://schemas.microsoft.com/office/drawing/2014/main" id="{77B3E430-2E0C-C8B7-1253-7F00552ECA65}"/>
+              </a:ext>
+            </a:extLst>
+          </p:cNvPr>
+          <p:cNvPicPr>
+            <a:picLocks noChangeAspect="1"/>
+          </p:cNvPicPr>
           <p:nvPr/>
-        </p:nvSpPr>
+        </p:nvPicPr>
+        <p:blipFill>
+          <a:blip r:embed="rId3"/>
+          <a:stretch>
+            <a:fillRect/>
+          </a:stretch>
+        </p:blipFill>
         <p:spPr>
           <a:xfrm>
-            <a:off x="5815403" y="3590256"/>
-            <a:ext cx="5168281" cy="523220"/>
+            <a:off x="6161596" y="2113475"/>
+            <a:ext cx="4855847" cy="3038628"/>
           </a:xfrm>
           <a:prstGeom prst="rect">
             <a:avLst/>
           </a:prstGeom>
-          <a:noFill/>
         </p:spPr>
-        <p:txBody>
-          <a:bodyPr wrap="square" rtlCol="0">
-            <a:spAutoFit/>
-          </a:bodyPr>
-          <a:lstStyle/>
-          <a:p>
-            <a:r>
-              <a:rPr lang="en-GB" sz="2800" dirty="0">
-                <a:solidFill>
-                  <a:schemeClr val="bg1"/>
-                </a:solidFill>
-              </a:rPr>
-              <a:t>Client SOC – PWM1 TRIGC</a:t>
-            </a:r>
-            <a:endParaRPr lang="en-US" sz="2800" dirty="0">
-              <a:solidFill>
-                <a:schemeClr val="bg1"/>
-              </a:solidFill>
-            </a:endParaRPr>
-          </a:p>
-        </p:txBody>
-      </p:sp>
-      <p:sp>
-        <p:nvSpPr>
-          <p:cNvPr id="20" name="TextBox 19">
-            <a:extLst>
-              <a:ext uri="{FF2B5EF4-FFF2-40B4-BE49-F238E27FC236}">
-                <a16:creationId xmlns:a16="http://schemas.microsoft.com/office/drawing/2014/main" id="{87AD5278-260E-0785-7551-0769EB402078}"/>
-              </a:ext>
-            </a:extLst>
-          </p:cNvPr>
-          <p:cNvSpPr txBox="1"/>
+      </p:pic>
+    </p:spTree>
+    <p:extLst>
+      <p:ext uri="{BB962C8B-B14F-4D97-AF65-F5344CB8AC3E}">
+        <p14:creationId xmlns:p14="http://schemas.microsoft.com/office/powerpoint/2010/main" val="3844947417"/>
+      </p:ext>
+    </p:extLst>
+  </p:cSld>
+  <p:clrMapOvr>
+    <a:masterClrMapping/>
+  </p:clrMapOvr>
+</p:sld>
+</file>
+
+<file path=ppt/slides/slide6.xml><?xml version="1.0" encoding="utf-8"?>
+<p:sld xmlns:a="http://schemas.openxmlformats.org/drawingml/2006/main" xmlns:r="http://schemas.openxmlformats.org/officeDocument/2006/relationships" xmlns:p="http://schemas.openxmlformats.org/presentationml/2006/main">
+  <p:cSld>
+    <p:spTree>
+      <p:nvGrpSpPr>
+        <p:cNvPr id="1" name=""/>
+        <p:cNvGrpSpPr/>
+        <p:nvPr/>
+      </p:nvGrpSpPr>
+      <p:grpSpPr>
+        <a:xfrm>
+          <a:off x="0" y="0"/>
+          <a:ext cx="0" cy="0"/>
+          <a:chOff x="0" y="0"/>
+          <a:chExt cx="0" cy="0"/>
+        </a:xfrm>
+      </p:grpSpPr>
+      <p:sp>
+        <p:nvSpPr>
+          <p:cNvPr id="2" name="Title 1">
+            <a:extLst>
+              <a:ext uri="{FF2B5EF4-FFF2-40B4-BE49-F238E27FC236}">
+                <a16:creationId xmlns:a16="http://schemas.microsoft.com/office/drawing/2014/main" id="{2662B85C-9BD0-E902-1372-BF87328EA70F}"/>
+              </a:ext>
+            </a:extLst>
+          </p:cNvPr>
+          <p:cNvSpPr>
+            <a:spLocks noGrp="1"/>
+          </p:cNvSpPr>
+          <p:nvPr>
+            <p:ph type="title"/>
+          </p:nvPr>
+        </p:nvSpPr>
+        <p:spPr/>
+        <p:txBody>
+          <a:bodyPr/>
+          <a:lstStyle/>
+          <a:p>
+            <a:r>
+              <a:rPr lang="en-GB" dirty="0"/>
+              <a:t>MCC PWM4</a:t>
+            </a:r>
+            <a:endParaRPr lang="en-US" dirty="0"/>
+          </a:p>
+        </p:txBody>
+      </p:sp>
+      <p:pic>
+        <p:nvPicPr>
+          <p:cNvPr id="5" name="Picture 4">
+            <a:extLst>
+              <a:ext uri="{FF2B5EF4-FFF2-40B4-BE49-F238E27FC236}">
+                <a16:creationId xmlns:a16="http://schemas.microsoft.com/office/drawing/2014/main" id="{0BEF86CC-28EF-5A45-500F-EFF1FD1BCD71}"/>
+              </a:ext>
+            </a:extLst>
+          </p:cNvPr>
+          <p:cNvPicPr>
+            <a:picLocks noChangeAspect="1"/>
+          </p:cNvPicPr>
           <p:nvPr/>
-        </p:nvSpPr>
+        </p:nvPicPr>
+        <p:blipFill>
+          <a:blip r:embed="rId2"/>
+          <a:stretch>
+            <a:fillRect/>
+          </a:stretch>
+        </p:blipFill>
         <p:spPr>
           <a:xfrm>
-            <a:off x="5754317" y="4774297"/>
-            <a:ext cx="5168281" cy="523220"/>
+            <a:off x="712839" y="1690688"/>
+            <a:ext cx="5275043" cy="3992357"/>
           </a:xfrm>
           <a:prstGeom prst="rect">
             <a:avLst/>
           </a:prstGeom>
-          <a:noFill/>
         </p:spPr>
-        <p:txBody>
-          <a:bodyPr wrap="square" rtlCol="0">
-            <a:spAutoFit/>
-          </a:bodyPr>
-          <a:lstStyle/>
-          <a:p>
-            <a:r>
-              <a:rPr lang="en-GB" sz="2800" dirty="0">
-                <a:solidFill>
-                  <a:schemeClr val="bg1"/>
-                </a:solidFill>
-              </a:rPr>
-              <a:t>Client SOC – PWM2 TRIGC</a:t>
-            </a:r>
-            <a:endParaRPr lang="en-US" sz="2800" dirty="0">
-              <a:solidFill>
-                <a:schemeClr val="bg1"/>
-              </a:solidFill>
-            </a:endParaRPr>
-          </a:p>
-        </p:txBody>
-      </p:sp>
+      </p:pic>
+      <p:pic>
+        <p:nvPicPr>
+          <p:cNvPr id="7" name="Picture 6">
+            <a:extLst>
+              <a:ext uri="{FF2B5EF4-FFF2-40B4-BE49-F238E27FC236}">
+                <a16:creationId xmlns:a16="http://schemas.microsoft.com/office/drawing/2014/main" id="{155D67CD-55D0-57FC-B024-EC38E5C73E49}"/>
+              </a:ext>
+            </a:extLst>
+          </p:cNvPr>
+          <p:cNvPicPr>
+            <a:picLocks noChangeAspect="1"/>
+          </p:cNvPicPr>
+          <p:nvPr/>
+        </p:nvPicPr>
+        <p:blipFill>
+          <a:blip r:embed="rId3"/>
+          <a:stretch>
+            <a:fillRect/>
+          </a:stretch>
+        </p:blipFill>
+        <p:spPr>
+          <a:xfrm>
+            <a:off x="6231188" y="2079061"/>
+            <a:ext cx="5115196" cy="3391032"/>
+          </a:xfrm>
+          <a:prstGeom prst="rect">
+            <a:avLst/>
+          </a:prstGeom>
+        </p:spPr>
+      </p:pic>
     </p:spTree>
     <p:extLst>
       <p:ext uri="{BB962C8B-B14F-4D97-AF65-F5344CB8AC3E}">
-        <p14:creationId xmlns:p14="http://schemas.microsoft.com/office/powerpoint/2010/main" val="2144217614"/>
+        <p14:creationId xmlns:p14="http://schemas.microsoft.com/office/powerpoint/2010/main" val="599940425"/>
       </p:ext>
     </p:extLst>
   </p:cSld>

</xml_diff>

<commit_message>
added vinVoltage PWM capture
</commit_message>
<xml_diff>
--- a/dab_development.pptx
+++ b/dab_development.pptx
@@ -11,6 +11,7 @@
     <p:sldId id="259" r:id="rId5"/>
     <p:sldId id="260" r:id="rId6"/>
     <p:sldId id="261" r:id="rId7"/>
+    <p:sldId id="262" r:id="rId8"/>
   </p:sldIdLst>
   <p:sldSz cx="12192000" cy="6858000"/>
   <p:notesSz cx="6858000" cy="9144000"/>
@@ -264,7 +265,7 @@
           <a:p>
             <a:fld id="{C8B5CE37-4518-4420-8E81-BDF4C2BF2F94}" type="datetimeFigureOut">
               <a:rPr lang="en-US" smtClean="0"/>
-              <a:t>7/4/2024</a:t>
+              <a:t>7/16/2024</a:t>
             </a:fld>
             <a:endParaRPr lang="en-US"/>
           </a:p>
@@ -462,7 +463,7 @@
           <a:p>
             <a:fld id="{C8B5CE37-4518-4420-8E81-BDF4C2BF2F94}" type="datetimeFigureOut">
               <a:rPr lang="en-US" smtClean="0"/>
-              <a:t>7/4/2024</a:t>
+              <a:t>7/16/2024</a:t>
             </a:fld>
             <a:endParaRPr lang="en-US"/>
           </a:p>
@@ -670,7 +671,7 @@
           <a:p>
             <a:fld id="{C8B5CE37-4518-4420-8E81-BDF4C2BF2F94}" type="datetimeFigureOut">
               <a:rPr lang="en-US" smtClean="0"/>
-              <a:t>7/4/2024</a:t>
+              <a:t>7/16/2024</a:t>
             </a:fld>
             <a:endParaRPr lang="en-US"/>
           </a:p>
@@ -868,7 +869,7 @@
           <a:p>
             <a:fld id="{C8B5CE37-4518-4420-8E81-BDF4C2BF2F94}" type="datetimeFigureOut">
               <a:rPr lang="en-US" smtClean="0"/>
-              <a:t>7/4/2024</a:t>
+              <a:t>7/16/2024</a:t>
             </a:fld>
             <a:endParaRPr lang="en-US"/>
           </a:p>
@@ -1143,7 +1144,7 @@
           <a:p>
             <a:fld id="{C8B5CE37-4518-4420-8E81-BDF4C2BF2F94}" type="datetimeFigureOut">
               <a:rPr lang="en-US" smtClean="0"/>
-              <a:t>7/4/2024</a:t>
+              <a:t>7/16/2024</a:t>
             </a:fld>
             <a:endParaRPr lang="en-US"/>
           </a:p>
@@ -1408,7 +1409,7 @@
           <a:p>
             <a:fld id="{C8B5CE37-4518-4420-8E81-BDF4C2BF2F94}" type="datetimeFigureOut">
               <a:rPr lang="en-US" smtClean="0"/>
-              <a:t>7/4/2024</a:t>
+              <a:t>7/16/2024</a:t>
             </a:fld>
             <a:endParaRPr lang="en-US"/>
           </a:p>
@@ -1820,7 +1821,7 @@
           <a:p>
             <a:fld id="{C8B5CE37-4518-4420-8E81-BDF4C2BF2F94}" type="datetimeFigureOut">
               <a:rPr lang="en-US" smtClean="0"/>
-              <a:t>7/4/2024</a:t>
+              <a:t>7/16/2024</a:t>
             </a:fld>
             <a:endParaRPr lang="en-US"/>
           </a:p>
@@ -1961,7 +1962,7 @@
           <a:p>
             <a:fld id="{C8B5CE37-4518-4420-8E81-BDF4C2BF2F94}" type="datetimeFigureOut">
               <a:rPr lang="en-US" smtClean="0"/>
-              <a:t>7/4/2024</a:t>
+              <a:t>7/16/2024</a:t>
             </a:fld>
             <a:endParaRPr lang="en-US"/>
           </a:p>
@@ -2074,7 +2075,7 @@
           <a:p>
             <a:fld id="{C8B5CE37-4518-4420-8E81-BDF4C2BF2F94}" type="datetimeFigureOut">
               <a:rPr lang="en-US" smtClean="0"/>
-              <a:t>7/4/2024</a:t>
+              <a:t>7/16/2024</a:t>
             </a:fld>
             <a:endParaRPr lang="en-US"/>
           </a:p>
@@ -2385,7 +2386,7 @@
           <a:p>
             <a:fld id="{C8B5CE37-4518-4420-8E81-BDF4C2BF2F94}" type="datetimeFigureOut">
               <a:rPr lang="en-US" smtClean="0"/>
-              <a:t>7/4/2024</a:t>
+              <a:t>7/16/2024</a:t>
             </a:fld>
             <a:endParaRPr lang="en-US"/>
           </a:p>
@@ -2673,7 +2674,7 @@
           <a:p>
             <a:fld id="{C8B5CE37-4518-4420-8E81-BDF4C2BF2F94}" type="datetimeFigureOut">
               <a:rPr lang="en-US" smtClean="0"/>
-              <a:t>7/4/2024</a:t>
+              <a:t>7/16/2024</a:t>
             </a:fld>
             <a:endParaRPr lang="en-US"/>
           </a:p>
@@ -2914,7 +2915,7 @@
           <a:p>
             <a:fld id="{C8B5CE37-4518-4420-8E81-BDF4C2BF2F94}" type="datetimeFigureOut">
               <a:rPr lang="en-US" smtClean="0"/>
-              <a:t>7/4/2024</a:t>
+              <a:t>7/16/2024</a:t>
             </a:fld>
             <a:endParaRPr lang="en-US"/>
           </a:p>
@@ -4837,6 +4838,110 @@
     <p:extLst>
       <p:ext uri="{BB962C8B-B14F-4D97-AF65-F5344CB8AC3E}">
         <p14:creationId xmlns:p14="http://schemas.microsoft.com/office/powerpoint/2010/main" val="599940425"/>
+      </p:ext>
+    </p:extLst>
+  </p:cSld>
+  <p:clrMapOvr>
+    <a:masterClrMapping/>
+  </p:clrMapOvr>
+</p:sld>
+</file>
+
+<file path=ppt/slides/slide7.xml><?xml version="1.0" encoding="utf-8"?>
+<p:sld xmlns:a="http://schemas.openxmlformats.org/drawingml/2006/main" xmlns:r="http://schemas.openxmlformats.org/officeDocument/2006/relationships" xmlns:p="http://schemas.openxmlformats.org/presentationml/2006/main">
+  <p:cSld>
+    <p:spTree>
+      <p:nvGrpSpPr>
+        <p:cNvPr id="1" name=""/>
+        <p:cNvGrpSpPr/>
+        <p:nvPr/>
+      </p:nvGrpSpPr>
+      <p:grpSpPr>
+        <a:xfrm>
+          <a:off x="0" y="0"/>
+          <a:ext cx="0" cy="0"/>
+          <a:chOff x="0" y="0"/>
+          <a:chExt cx="0" cy="0"/>
+        </a:xfrm>
+      </p:grpSpPr>
+      <p:sp>
+        <p:nvSpPr>
+          <p:cNvPr id="2" name="Title 1">
+            <a:extLst>
+              <a:ext uri="{FF2B5EF4-FFF2-40B4-BE49-F238E27FC236}">
+                <a16:creationId xmlns:a16="http://schemas.microsoft.com/office/drawing/2014/main" id="{0C0C767E-2676-265A-9BE8-8927E07B68C2}"/>
+              </a:ext>
+            </a:extLst>
+          </p:cNvPr>
+          <p:cNvSpPr>
+            <a:spLocks noGrp="1"/>
+          </p:cNvSpPr>
+          <p:nvPr>
+            <p:ph type="title"/>
+          </p:nvPr>
+        </p:nvSpPr>
+        <p:spPr/>
+        <p:txBody>
+          <a:bodyPr/>
+          <a:lstStyle/>
+          <a:p>
+            <a:r>
+              <a:rPr lang="en-GB" dirty="0" err="1"/>
+              <a:t>FB_Vdd</a:t>
+            </a:r>
+            <a:r>
+              <a:rPr lang="en-GB" dirty="0"/>
+              <a:t>-PWM_P fault implementation</a:t>
+            </a:r>
+            <a:endParaRPr lang="en-US" dirty="0"/>
+          </a:p>
+        </p:txBody>
+      </p:sp>
+      <p:sp>
+        <p:nvSpPr>
+          <p:cNvPr id="3" name="Content Placeholder 2">
+            <a:extLst>
+              <a:ext uri="{FF2B5EF4-FFF2-40B4-BE49-F238E27FC236}">
+                <a16:creationId xmlns:a16="http://schemas.microsoft.com/office/drawing/2014/main" id="{1D0355C9-6F0D-FB60-3040-36369FC49B58}"/>
+              </a:ext>
+            </a:extLst>
+          </p:cNvPr>
+          <p:cNvSpPr>
+            <a:spLocks noGrp="1"/>
+          </p:cNvSpPr>
+          <p:nvPr>
+            <p:ph idx="1"/>
+          </p:nvPr>
+        </p:nvSpPr>
+        <p:spPr/>
+        <p:txBody>
+          <a:bodyPr/>
+          <a:lstStyle/>
+          <a:p>
+            <a:r>
+              <a:rPr lang="en-GB" dirty="0"/>
+              <a:t>SCCP2 input capture</a:t>
+            </a:r>
+          </a:p>
+          <a:p>
+            <a:r>
+              <a:rPr lang="en-GB" dirty="0"/>
+              <a:t>CLC2</a:t>
+            </a:r>
+          </a:p>
+          <a:p>
+            <a:r>
+              <a:rPr lang="en-GB" dirty="0"/>
+              <a:t>DMA2</a:t>
+            </a:r>
+            <a:endParaRPr lang="en-US" dirty="0"/>
+          </a:p>
+        </p:txBody>
+      </p:sp>
+    </p:spTree>
+    <p:extLst>
+      <p:ext uri="{BB962C8B-B14F-4D97-AF65-F5344CB8AC3E}">
+        <p14:creationId xmlns:p14="http://schemas.microsoft.com/office/powerpoint/2010/main" val="1509000435"/>
       </p:ext>
     </p:extLst>
   </p:cSld>

</xml_diff>

<commit_message>
added version.h for version control
</commit_message>
<xml_diff>
--- a/dab_development.pptx
+++ b/dab_development.pptx
@@ -12,6 +12,13 @@
     <p:sldId id="260" r:id="rId6"/>
     <p:sldId id="261" r:id="rId7"/>
     <p:sldId id="262" r:id="rId8"/>
+    <p:sldId id="263" r:id="rId9"/>
+    <p:sldId id="264" r:id="rId10"/>
+    <p:sldId id="265" r:id="rId11"/>
+    <p:sldId id="266" r:id="rId12"/>
+    <p:sldId id="267" r:id="rId13"/>
+    <p:sldId id="268" r:id="rId14"/>
+    <p:sldId id="269" r:id="rId15"/>
   </p:sldIdLst>
   <p:sldSz cx="12192000" cy="6858000"/>
   <p:notesSz cx="6858000" cy="9144000"/>
@@ -265,7 +272,7 @@
           <a:p>
             <a:fld id="{C8B5CE37-4518-4420-8E81-BDF4C2BF2F94}" type="datetimeFigureOut">
               <a:rPr lang="en-US" smtClean="0"/>
-              <a:t>7/16/2024</a:t>
+              <a:t>7/23/2024</a:t>
             </a:fld>
             <a:endParaRPr lang="en-US"/>
           </a:p>
@@ -463,7 +470,7 @@
           <a:p>
             <a:fld id="{C8B5CE37-4518-4420-8E81-BDF4C2BF2F94}" type="datetimeFigureOut">
               <a:rPr lang="en-US" smtClean="0"/>
-              <a:t>7/16/2024</a:t>
+              <a:t>7/23/2024</a:t>
             </a:fld>
             <a:endParaRPr lang="en-US"/>
           </a:p>
@@ -671,7 +678,7 @@
           <a:p>
             <a:fld id="{C8B5CE37-4518-4420-8E81-BDF4C2BF2F94}" type="datetimeFigureOut">
               <a:rPr lang="en-US" smtClean="0"/>
-              <a:t>7/16/2024</a:t>
+              <a:t>7/23/2024</a:t>
             </a:fld>
             <a:endParaRPr lang="en-US"/>
           </a:p>
@@ -869,7 +876,7 @@
           <a:p>
             <a:fld id="{C8B5CE37-4518-4420-8E81-BDF4C2BF2F94}" type="datetimeFigureOut">
               <a:rPr lang="en-US" smtClean="0"/>
-              <a:t>7/16/2024</a:t>
+              <a:t>7/23/2024</a:t>
             </a:fld>
             <a:endParaRPr lang="en-US"/>
           </a:p>
@@ -1144,7 +1151,7 @@
           <a:p>
             <a:fld id="{C8B5CE37-4518-4420-8E81-BDF4C2BF2F94}" type="datetimeFigureOut">
               <a:rPr lang="en-US" smtClean="0"/>
-              <a:t>7/16/2024</a:t>
+              <a:t>7/23/2024</a:t>
             </a:fld>
             <a:endParaRPr lang="en-US"/>
           </a:p>
@@ -1409,7 +1416,7 @@
           <a:p>
             <a:fld id="{C8B5CE37-4518-4420-8E81-BDF4C2BF2F94}" type="datetimeFigureOut">
               <a:rPr lang="en-US" smtClean="0"/>
-              <a:t>7/16/2024</a:t>
+              <a:t>7/23/2024</a:t>
             </a:fld>
             <a:endParaRPr lang="en-US"/>
           </a:p>
@@ -1821,7 +1828,7 @@
           <a:p>
             <a:fld id="{C8B5CE37-4518-4420-8E81-BDF4C2BF2F94}" type="datetimeFigureOut">
               <a:rPr lang="en-US" smtClean="0"/>
-              <a:t>7/16/2024</a:t>
+              <a:t>7/23/2024</a:t>
             </a:fld>
             <a:endParaRPr lang="en-US"/>
           </a:p>
@@ -1962,7 +1969,7 @@
           <a:p>
             <a:fld id="{C8B5CE37-4518-4420-8E81-BDF4C2BF2F94}" type="datetimeFigureOut">
               <a:rPr lang="en-US" smtClean="0"/>
-              <a:t>7/16/2024</a:t>
+              <a:t>7/23/2024</a:t>
             </a:fld>
             <a:endParaRPr lang="en-US"/>
           </a:p>
@@ -2075,7 +2082,7 @@
           <a:p>
             <a:fld id="{C8B5CE37-4518-4420-8E81-BDF4C2BF2F94}" type="datetimeFigureOut">
               <a:rPr lang="en-US" smtClean="0"/>
-              <a:t>7/16/2024</a:t>
+              <a:t>7/23/2024</a:t>
             </a:fld>
             <a:endParaRPr lang="en-US"/>
           </a:p>
@@ -2386,7 +2393,7 @@
           <a:p>
             <a:fld id="{C8B5CE37-4518-4420-8E81-BDF4C2BF2F94}" type="datetimeFigureOut">
               <a:rPr lang="en-US" smtClean="0"/>
-              <a:t>7/16/2024</a:t>
+              <a:t>7/23/2024</a:t>
             </a:fld>
             <a:endParaRPr lang="en-US"/>
           </a:p>
@@ -2674,7 +2681,7 @@
           <a:p>
             <a:fld id="{C8B5CE37-4518-4420-8E81-BDF4C2BF2F94}" type="datetimeFigureOut">
               <a:rPr lang="en-US" smtClean="0"/>
-              <a:t>7/16/2024</a:t>
+              <a:t>7/23/2024</a:t>
             </a:fld>
             <a:endParaRPr lang="en-US"/>
           </a:p>
@@ -2915,7 +2922,7 @@
           <a:p>
             <a:fld id="{C8B5CE37-4518-4420-8E81-BDF4C2BF2F94}" type="datetimeFigureOut">
               <a:rPr lang="en-US" smtClean="0"/>
-              <a:t>7/16/2024</a:t>
+              <a:t>7/23/2024</a:t>
             </a:fld>
             <a:endParaRPr lang="en-US"/>
           </a:p>
@@ -3399,6 +3406,538 @@
 </p:sld>
 </file>
 
+<file path=ppt/slides/slide10.xml><?xml version="1.0" encoding="utf-8"?>
+<p:sld xmlns:a="http://schemas.openxmlformats.org/drawingml/2006/main" xmlns:r="http://schemas.openxmlformats.org/officeDocument/2006/relationships" xmlns:p="http://schemas.openxmlformats.org/presentationml/2006/main">
+  <p:cSld>
+    <p:spTree>
+      <p:nvGrpSpPr>
+        <p:cNvPr id="1" name=""/>
+        <p:cNvGrpSpPr/>
+        <p:nvPr/>
+      </p:nvGrpSpPr>
+      <p:grpSpPr>
+        <a:xfrm>
+          <a:off x="0" y="0"/>
+          <a:ext cx="0" cy="0"/>
+          <a:chOff x="0" y="0"/>
+          <a:chExt cx="0" cy="0"/>
+        </a:xfrm>
+      </p:grpSpPr>
+      <p:sp>
+        <p:nvSpPr>
+          <p:cNvPr id="2" name="Title 1">
+            <a:extLst>
+              <a:ext uri="{FF2B5EF4-FFF2-40B4-BE49-F238E27FC236}">
+                <a16:creationId xmlns:a16="http://schemas.microsoft.com/office/drawing/2014/main" id="{0F979613-0C3F-DA21-9068-6FA4227317F7}"/>
+              </a:ext>
+            </a:extLst>
+          </p:cNvPr>
+          <p:cNvSpPr>
+            <a:spLocks noGrp="1"/>
+          </p:cNvSpPr>
+          <p:nvPr>
+            <p:ph type="title"/>
+          </p:nvPr>
+        </p:nvSpPr>
+        <p:spPr/>
+        <p:txBody>
+          <a:bodyPr/>
+          <a:lstStyle/>
+          <a:p>
+            <a:endParaRPr lang="en-US"/>
+          </a:p>
+        </p:txBody>
+      </p:sp>
+      <p:sp>
+        <p:nvSpPr>
+          <p:cNvPr id="3" name="Content Placeholder 2">
+            <a:extLst>
+              <a:ext uri="{FF2B5EF4-FFF2-40B4-BE49-F238E27FC236}">
+                <a16:creationId xmlns:a16="http://schemas.microsoft.com/office/drawing/2014/main" id="{4E9E4744-F7C8-60E6-E4BE-77826EB41225}"/>
+              </a:ext>
+            </a:extLst>
+          </p:cNvPr>
+          <p:cNvSpPr>
+            <a:spLocks noGrp="1"/>
+          </p:cNvSpPr>
+          <p:nvPr>
+            <p:ph idx="1"/>
+          </p:nvPr>
+        </p:nvSpPr>
+        <p:spPr/>
+        <p:txBody>
+          <a:bodyPr/>
+          <a:lstStyle/>
+          <a:p>
+            <a:endParaRPr lang="en-US"/>
+          </a:p>
+        </p:txBody>
+      </p:sp>
+      <p:pic>
+        <p:nvPicPr>
+          <p:cNvPr id="5" name="Picture 4">
+            <a:extLst>
+              <a:ext uri="{FF2B5EF4-FFF2-40B4-BE49-F238E27FC236}">
+                <a16:creationId xmlns:a16="http://schemas.microsoft.com/office/drawing/2014/main" id="{DC5E20E5-7F58-48E3-81EE-41F8B573C09A}"/>
+              </a:ext>
+            </a:extLst>
+          </p:cNvPr>
+          <p:cNvPicPr>
+            <a:picLocks noChangeAspect="1"/>
+          </p:cNvPicPr>
+          <p:nvPr/>
+        </p:nvPicPr>
+        <p:blipFill>
+          <a:blip r:embed="rId2"/>
+          <a:stretch>
+            <a:fillRect/>
+          </a:stretch>
+        </p:blipFill>
+        <p:spPr>
+          <a:xfrm>
+            <a:off x="1111045" y="1690688"/>
+            <a:ext cx="9969910" cy="4585675"/>
+          </a:xfrm>
+          <a:prstGeom prst="rect">
+            <a:avLst/>
+          </a:prstGeom>
+        </p:spPr>
+      </p:pic>
+    </p:spTree>
+    <p:extLst>
+      <p:ext uri="{BB962C8B-B14F-4D97-AF65-F5344CB8AC3E}">
+        <p14:creationId xmlns:p14="http://schemas.microsoft.com/office/powerpoint/2010/main" val="1889818504"/>
+      </p:ext>
+    </p:extLst>
+  </p:cSld>
+  <p:clrMapOvr>
+    <a:masterClrMapping/>
+  </p:clrMapOvr>
+</p:sld>
+</file>
+
+<file path=ppt/slides/slide11.xml><?xml version="1.0" encoding="utf-8"?>
+<p:sld xmlns:a="http://schemas.openxmlformats.org/drawingml/2006/main" xmlns:r="http://schemas.openxmlformats.org/officeDocument/2006/relationships" xmlns:p="http://schemas.openxmlformats.org/presentationml/2006/main">
+  <p:cSld>
+    <p:spTree>
+      <p:nvGrpSpPr>
+        <p:cNvPr id="1" name=""/>
+        <p:cNvGrpSpPr/>
+        <p:nvPr/>
+      </p:nvGrpSpPr>
+      <p:grpSpPr>
+        <a:xfrm>
+          <a:off x="0" y="0"/>
+          <a:ext cx="0" cy="0"/>
+          <a:chOff x="0" y="0"/>
+          <a:chExt cx="0" cy="0"/>
+        </a:xfrm>
+      </p:grpSpPr>
+      <p:sp>
+        <p:nvSpPr>
+          <p:cNvPr id="2" name="Title 1">
+            <a:extLst>
+              <a:ext uri="{FF2B5EF4-FFF2-40B4-BE49-F238E27FC236}">
+                <a16:creationId xmlns:a16="http://schemas.microsoft.com/office/drawing/2014/main" id="{76A91304-B4B0-596A-72C4-3B865AE1C0DF}"/>
+              </a:ext>
+            </a:extLst>
+          </p:cNvPr>
+          <p:cNvSpPr>
+            <a:spLocks noGrp="1"/>
+          </p:cNvSpPr>
+          <p:nvPr>
+            <p:ph type="title"/>
+          </p:nvPr>
+        </p:nvSpPr>
+        <p:spPr/>
+        <p:txBody>
+          <a:bodyPr/>
+          <a:lstStyle/>
+          <a:p>
+            <a:r>
+              <a:rPr lang="en-GB" dirty="0"/>
+              <a:t>Deadtime equation for ZVS</a:t>
+            </a:r>
+            <a:endParaRPr lang="en-US" dirty="0"/>
+          </a:p>
+        </p:txBody>
+      </p:sp>
+      <p:sp>
+        <p:nvSpPr>
+          <p:cNvPr id="7" name="Content Placeholder 6">
+            <a:extLst>
+              <a:ext uri="{FF2B5EF4-FFF2-40B4-BE49-F238E27FC236}">
+                <a16:creationId xmlns:a16="http://schemas.microsoft.com/office/drawing/2014/main" id="{7BF997F4-8516-C247-3A82-18A7ECEB01D1}"/>
+              </a:ext>
+            </a:extLst>
+          </p:cNvPr>
+          <p:cNvSpPr>
+            <a:spLocks noGrp="1"/>
+          </p:cNvSpPr>
+          <p:nvPr>
+            <p:ph idx="1"/>
+          </p:nvPr>
+        </p:nvSpPr>
+        <p:spPr/>
+        <p:txBody>
+          <a:bodyPr/>
+          <a:lstStyle/>
+          <a:p>
+            <a:endParaRPr lang="en-US"/>
+          </a:p>
+        </p:txBody>
+      </p:sp>
+      <p:pic>
+        <p:nvPicPr>
+          <p:cNvPr id="9" name="Picture 8">
+            <a:extLst>
+              <a:ext uri="{FF2B5EF4-FFF2-40B4-BE49-F238E27FC236}">
+                <a16:creationId xmlns:a16="http://schemas.microsoft.com/office/drawing/2014/main" id="{CB49E133-8586-1C6D-BFF1-D6AC4C48FECC}"/>
+              </a:ext>
+            </a:extLst>
+          </p:cNvPr>
+          <p:cNvPicPr>
+            <a:picLocks noChangeAspect="1"/>
+          </p:cNvPicPr>
+          <p:nvPr/>
+        </p:nvPicPr>
+        <p:blipFill>
+          <a:blip r:embed="rId2"/>
+          <a:stretch>
+            <a:fillRect/>
+          </a:stretch>
+        </p:blipFill>
+        <p:spPr>
+          <a:xfrm>
+            <a:off x="1499419" y="1874383"/>
+            <a:ext cx="9193161" cy="4302580"/>
+          </a:xfrm>
+          <a:prstGeom prst="rect">
+            <a:avLst/>
+          </a:prstGeom>
+        </p:spPr>
+      </p:pic>
+    </p:spTree>
+    <p:extLst>
+      <p:ext uri="{BB962C8B-B14F-4D97-AF65-F5344CB8AC3E}">
+        <p14:creationId xmlns:p14="http://schemas.microsoft.com/office/powerpoint/2010/main" val="3941589255"/>
+      </p:ext>
+    </p:extLst>
+  </p:cSld>
+  <p:clrMapOvr>
+    <a:masterClrMapping/>
+  </p:clrMapOvr>
+</p:sld>
+</file>
+
+<file path=ppt/slides/slide12.xml><?xml version="1.0" encoding="utf-8"?>
+<p:sld xmlns:a="http://schemas.openxmlformats.org/drawingml/2006/main" xmlns:r="http://schemas.openxmlformats.org/officeDocument/2006/relationships" xmlns:p="http://schemas.openxmlformats.org/presentationml/2006/main">
+  <p:cSld>
+    <p:spTree>
+      <p:nvGrpSpPr>
+        <p:cNvPr id="1" name=""/>
+        <p:cNvGrpSpPr/>
+        <p:nvPr/>
+      </p:nvGrpSpPr>
+      <p:grpSpPr>
+        <a:xfrm>
+          <a:off x="0" y="0"/>
+          <a:ext cx="0" cy="0"/>
+          <a:chOff x="0" y="0"/>
+          <a:chExt cx="0" cy="0"/>
+        </a:xfrm>
+      </p:grpSpPr>
+      <p:sp>
+        <p:nvSpPr>
+          <p:cNvPr id="2" name="Title 1">
+            <a:extLst>
+              <a:ext uri="{FF2B5EF4-FFF2-40B4-BE49-F238E27FC236}">
+                <a16:creationId xmlns:a16="http://schemas.microsoft.com/office/drawing/2014/main" id="{0C869BC3-572E-5081-0839-2B4FD5FB7209}"/>
+              </a:ext>
+            </a:extLst>
+          </p:cNvPr>
+          <p:cNvSpPr>
+            <a:spLocks noGrp="1"/>
+          </p:cNvSpPr>
+          <p:nvPr>
+            <p:ph type="title"/>
+          </p:nvPr>
+        </p:nvSpPr>
+        <p:spPr/>
+        <p:txBody>
+          <a:bodyPr/>
+          <a:lstStyle/>
+          <a:p>
+            <a:r>
+              <a:rPr lang="en-GB" dirty="0"/>
+              <a:t>ZCS</a:t>
+            </a:r>
+            <a:endParaRPr lang="en-US" dirty="0"/>
+          </a:p>
+        </p:txBody>
+      </p:sp>
+      <p:sp>
+        <p:nvSpPr>
+          <p:cNvPr id="3" name="Content Placeholder 2">
+            <a:extLst>
+              <a:ext uri="{FF2B5EF4-FFF2-40B4-BE49-F238E27FC236}">
+                <a16:creationId xmlns:a16="http://schemas.microsoft.com/office/drawing/2014/main" id="{EFABD6F2-1343-3621-53EE-37EA834D1C66}"/>
+              </a:ext>
+            </a:extLst>
+          </p:cNvPr>
+          <p:cNvSpPr>
+            <a:spLocks noGrp="1"/>
+          </p:cNvSpPr>
+          <p:nvPr>
+            <p:ph idx="1"/>
+          </p:nvPr>
+        </p:nvSpPr>
+        <p:spPr/>
+        <p:txBody>
+          <a:bodyPr/>
+          <a:lstStyle/>
+          <a:p>
+            <a:endParaRPr lang="en-US"/>
+          </a:p>
+        </p:txBody>
+      </p:sp>
+      <p:pic>
+        <p:nvPicPr>
+          <p:cNvPr id="7" name="Picture 6">
+            <a:extLst>
+              <a:ext uri="{FF2B5EF4-FFF2-40B4-BE49-F238E27FC236}">
+                <a16:creationId xmlns:a16="http://schemas.microsoft.com/office/drawing/2014/main" id="{1E1B0D0C-613D-07C3-7D7D-CA6A19837B0C}"/>
+              </a:ext>
+            </a:extLst>
+          </p:cNvPr>
+          <p:cNvPicPr>
+            <a:picLocks noChangeAspect="1"/>
+          </p:cNvPicPr>
+          <p:nvPr/>
+        </p:nvPicPr>
+        <p:blipFill>
+          <a:blip r:embed="rId2"/>
+          <a:stretch>
+            <a:fillRect/>
+          </a:stretch>
+        </p:blipFill>
+        <p:spPr>
+          <a:xfrm>
+            <a:off x="1135626" y="1890697"/>
+            <a:ext cx="9920748" cy="4421203"/>
+          </a:xfrm>
+          <a:prstGeom prst="rect">
+            <a:avLst/>
+          </a:prstGeom>
+        </p:spPr>
+      </p:pic>
+    </p:spTree>
+    <p:extLst>
+      <p:ext uri="{BB962C8B-B14F-4D97-AF65-F5344CB8AC3E}">
+        <p14:creationId xmlns:p14="http://schemas.microsoft.com/office/powerpoint/2010/main" val="2607830432"/>
+      </p:ext>
+    </p:extLst>
+  </p:cSld>
+  <p:clrMapOvr>
+    <a:masterClrMapping/>
+  </p:clrMapOvr>
+</p:sld>
+</file>
+
+<file path=ppt/slides/slide13.xml><?xml version="1.0" encoding="utf-8"?>
+<p:sld xmlns:a="http://schemas.openxmlformats.org/drawingml/2006/main" xmlns:r="http://schemas.openxmlformats.org/officeDocument/2006/relationships" xmlns:p="http://schemas.openxmlformats.org/presentationml/2006/main">
+  <p:cSld>
+    <p:spTree>
+      <p:nvGrpSpPr>
+        <p:cNvPr id="1" name=""/>
+        <p:cNvGrpSpPr/>
+        <p:nvPr/>
+      </p:nvGrpSpPr>
+      <p:grpSpPr>
+        <a:xfrm>
+          <a:off x="0" y="0"/>
+          <a:ext cx="0" cy="0"/>
+          <a:chOff x="0" y="0"/>
+          <a:chExt cx="0" cy="0"/>
+        </a:xfrm>
+      </p:grpSpPr>
+      <p:sp>
+        <p:nvSpPr>
+          <p:cNvPr id="2" name="Title 1">
+            <a:extLst>
+              <a:ext uri="{FF2B5EF4-FFF2-40B4-BE49-F238E27FC236}">
+                <a16:creationId xmlns:a16="http://schemas.microsoft.com/office/drawing/2014/main" id="{3E4F9656-8A02-7F5B-B8B5-CEF16C5CF8F1}"/>
+              </a:ext>
+            </a:extLst>
+          </p:cNvPr>
+          <p:cNvSpPr>
+            <a:spLocks noGrp="1"/>
+          </p:cNvSpPr>
+          <p:nvPr>
+            <p:ph type="title"/>
+          </p:nvPr>
+        </p:nvSpPr>
+        <p:spPr/>
+        <p:txBody>
+          <a:bodyPr/>
+          <a:lstStyle/>
+          <a:p>
+            <a:r>
+              <a:rPr lang="en-GB" dirty="0"/>
+              <a:t>A new modulation to achieve soft switching ZCS</a:t>
+            </a:r>
+            <a:endParaRPr lang="en-US" dirty="0"/>
+          </a:p>
+        </p:txBody>
+      </p:sp>
+      <p:sp>
+        <p:nvSpPr>
+          <p:cNvPr id="3" name="Content Placeholder 2">
+            <a:extLst>
+              <a:ext uri="{FF2B5EF4-FFF2-40B4-BE49-F238E27FC236}">
+                <a16:creationId xmlns:a16="http://schemas.microsoft.com/office/drawing/2014/main" id="{B0764B0B-D987-AEA7-0B81-5CC4D4798ED8}"/>
+              </a:ext>
+            </a:extLst>
+          </p:cNvPr>
+          <p:cNvSpPr>
+            <a:spLocks noGrp="1"/>
+          </p:cNvSpPr>
+          <p:nvPr>
+            <p:ph idx="1"/>
+          </p:nvPr>
+        </p:nvSpPr>
+        <p:spPr/>
+        <p:txBody>
+          <a:bodyPr/>
+          <a:lstStyle/>
+          <a:p>
+            <a:endParaRPr lang="en-US"/>
+          </a:p>
+        </p:txBody>
+      </p:sp>
+      <p:pic>
+        <p:nvPicPr>
+          <p:cNvPr id="5" name="Picture 4">
+            <a:extLst>
+              <a:ext uri="{FF2B5EF4-FFF2-40B4-BE49-F238E27FC236}">
+                <a16:creationId xmlns:a16="http://schemas.microsoft.com/office/drawing/2014/main" id="{F980982A-A0B2-BE8A-F0B0-1B5936C228AE}"/>
+              </a:ext>
+            </a:extLst>
+          </p:cNvPr>
+          <p:cNvPicPr>
+            <a:picLocks noChangeAspect="1"/>
+          </p:cNvPicPr>
+          <p:nvPr/>
+        </p:nvPicPr>
+        <p:blipFill>
+          <a:blip r:embed="rId2"/>
+          <a:stretch>
+            <a:fillRect/>
+          </a:stretch>
+        </p:blipFill>
+        <p:spPr>
+          <a:xfrm>
+            <a:off x="2182762" y="1760799"/>
+            <a:ext cx="8062452" cy="4416164"/>
+          </a:xfrm>
+          <a:prstGeom prst="rect">
+            <a:avLst/>
+          </a:prstGeom>
+        </p:spPr>
+      </p:pic>
+    </p:spTree>
+    <p:extLst>
+      <p:ext uri="{BB962C8B-B14F-4D97-AF65-F5344CB8AC3E}">
+        <p14:creationId xmlns:p14="http://schemas.microsoft.com/office/powerpoint/2010/main" val="1972535056"/>
+      </p:ext>
+    </p:extLst>
+  </p:cSld>
+  <p:clrMapOvr>
+    <a:masterClrMapping/>
+  </p:clrMapOvr>
+</p:sld>
+</file>
+
+<file path=ppt/slides/slide14.xml><?xml version="1.0" encoding="utf-8"?>
+<p:sld xmlns:a="http://schemas.openxmlformats.org/drawingml/2006/main" xmlns:r="http://schemas.openxmlformats.org/officeDocument/2006/relationships" xmlns:p="http://schemas.openxmlformats.org/presentationml/2006/main">
+  <p:cSld>
+    <p:spTree>
+      <p:nvGrpSpPr>
+        <p:cNvPr id="1" name=""/>
+        <p:cNvGrpSpPr/>
+        <p:nvPr/>
+      </p:nvGrpSpPr>
+      <p:grpSpPr>
+        <a:xfrm>
+          <a:off x="0" y="0"/>
+          <a:ext cx="0" cy="0"/>
+          <a:chOff x="0" y="0"/>
+          <a:chExt cx="0" cy="0"/>
+        </a:xfrm>
+      </p:grpSpPr>
+      <p:sp>
+        <p:nvSpPr>
+          <p:cNvPr id="2" name="Title 1">
+            <a:extLst>
+              <a:ext uri="{FF2B5EF4-FFF2-40B4-BE49-F238E27FC236}">
+                <a16:creationId xmlns:a16="http://schemas.microsoft.com/office/drawing/2014/main" id="{1E32A32D-96DE-6982-93F2-F5ECBFA20CFB}"/>
+              </a:ext>
+            </a:extLst>
+          </p:cNvPr>
+          <p:cNvSpPr>
+            <a:spLocks noGrp="1"/>
+          </p:cNvSpPr>
+          <p:nvPr>
+            <p:ph type="title"/>
+          </p:nvPr>
+        </p:nvSpPr>
+        <p:spPr/>
+        <p:txBody>
+          <a:bodyPr/>
+          <a:lstStyle/>
+          <a:p>
+            <a:endParaRPr lang="en-US"/>
+          </a:p>
+        </p:txBody>
+      </p:sp>
+      <p:sp>
+        <p:nvSpPr>
+          <p:cNvPr id="3" name="Content Placeholder 2">
+            <a:extLst>
+              <a:ext uri="{FF2B5EF4-FFF2-40B4-BE49-F238E27FC236}">
+                <a16:creationId xmlns:a16="http://schemas.microsoft.com/office/drawing/2014/main" id="{DFABC0B3-AE0C-341A-6500-5F1C2E5C447B}"/>
+              </a:ext>
+            </a:extLst>
+          </p:cNvPr>
+          <p:cNvSpPr>
+            <a:spLocks noGrp="1"/>
+          </p:cNvSpPr>
+          <p:nvPr>
+            <p:ph idx="1"/>
+          </p:nvPr>
+        </p:nvSpPr>
+        <p:spPr/>
+        <p:txBody>
+          <a:bodyPr/>
+          <a:lstStyle/>
+          <a:p>
+            <a:endParaRPr lang="en-US"/>
+          </a:p>
+        </p:txBody>
+      </p:sp>
+    </p:spTree>
+    <p:extLst>
+      <p:ext uri="{BB962C8B-B14F-4D97-AF65-F5344CB8AC3E}">
+        <p14:creationId xmlns:p14="http://schemas.microsoft.com/office/powerpoint/2010/main" val="1141618104"/>
+      </p:ext>
+    </p:extLst>
+  </p:cSld>
+  <p:clrMapOvr>
+    <a:masterClrMapping/>
+  </p:clrMapOvr>
+</p:sld>
+</file>
+
 <file path=ppt/slides/slide2.xml><?xml version="1.0" encoding="utf-8"?>
 <p:sld xmlns:a="http://schemas.openxmlformats.org/drawingml/2006/main" xmlns:r="http://schemas.openxmlformats.org/officeDocument/2006/relationships" xmlns:p="http://schemas.openxmlformats.org/presentationml/2006/main">
   <p:cSld>
@@ -4942,6 +5481,305 @@
     <p:extLst>
       <p:ext uri="{BB962C8B-B14F-4D97-AF65-F5344CB8AC3E}">
         <p14:creationId xmlns:p14="http://schemas.microsoft.com/office/powerpoint/2010/main" val="1509000435"/>
+      </p:ext>
+    </p:extLst>
+  </p:cSld>
+  <p:clrMapOvr>
+    <a:masterClrMapping/>
+  </p:clrMapOvr>
+</p:sld>
+</file>
+
+<file path=ppt/slides/slide8.xml><?xml version="1.0" encoding="utf-8"?>
+<p:sld xmlns:a="http://schemas.openxmlformats.org/drawingml/2006/main" xmlns:r="http://schemas.openxmlformats.org/officeDocument/2006/relationships" xmlns:p="http://schemas.openxmlformats.org/presentationml/2006/main">
+  <p:cSld>
+    <p:spTree>
+      <p:nvGrpSpPr>
+        <p:cNvPr id="1" name=""/>
+        <p:cNvGrpSpPr/>
+        <p:nvPr/>
+      </p:nvGrpSpPr>
+      <p:grpSpPr>
+        <a:xfrm>
+          <a:off x="0" y="0"/>
+          <a:ext cx="0" cy="0"/>
+          <a:chOff x="0" y="0"/>
+          <a:chExt cx="0" cy="0"/>
+        </a:xfrm>
+      </p:grpSpPr>
+      <p:sp>
+        <p:nvSpPr>
+          <p:cNvPr id="2" name="Title 1">
+            <a:extLst>
+              <a:ext uri="{FF2B5EF4-FFF2-40B4-BE49-F238E27FC236}">
+                <a16:creationId xmlns:a16="http://schemas.microsoft.com/office/drawing/2014/main" id="{3BEA2252-404E-8D38-5ADA-6830CAB15B42}"/>
+              </a:ext>
+            </a:extLst>
+          </p:cNvPr>
+          <p:cNvSpPr>
+            <a:spLocks noGrp="1"/>
+          </p:cNvSpPr>
+          <p:nvPr>
+            <p:ph type="title"/>
+          </p:nvPr>
+        </p:nvSpPr>
+        <p:spPr/>
+        <p:txBody>
+          <a:bodyPr/>
+          <a:lstStyle/>
+          <a:p>
+            <a:r>
+              <a:rPr lang="en-GB" dirty="0"/>
+              <a:t>DAB operation</a:t>
+            </a:r>
+            <a:endParaRPr lang="en-US" dirty="0"/>
+          </a:p>
+        </p:txBody>
+      </p:sp>
+      <p:pic>
+        <p:nvPicPr>
+          <p:cNvPr id="7" name="Picture 6">
+            <a:extLst>
+              <a:ext uri="{FF2B5EF4-FFF2-40B4-BE49-F238E27FC236}">
+                <a16:creationId xmlns:a16="http://schemas.microsoft.com/office/drawing/2014/main" id="{11AD3DFE-3AA8-01F3-C023-46349D5AB856}"/>
+              </a:ext>
+            </a:extLst>
+          </p:cNvPr>
+          <p:cNvPicPr>
+            <a:picLocks noChangeAspect="1"/>
+          </p:cNvPicPr>
+          <p:nvPr/>
+        </p:nvPicPr>
+        <p:blipFill>
+          <a:blip r:embed="rId2"/>
+          <a:stretch>
+            <a:fillRect/>
+          </a:stretch>
+        </p:blipFill>
+        <p:spPr>
+          <a:xfrm>
+            <a:off x="838200" y="1525505"/>
+            <a:ext cx="10097030" cy="4678649"/>
+          </a:xfrm>
+          <a:prstGeom prst="rect">
+            <a:avLst/>
+          </a:prstGeom>
+        </p:spPr>
+      </p:pic>
+    </p:spTree>
+    <p:extLst>
+      <p:ext uri="{BB962C8B-B14F-4D97-AF65-F5344CB8AC3E}">
+        <p14:creationId xmlns:p14="http://schemas.microsoft.com/office/powerpoint/2010/main" val="782662403"/>
+      </p:ext>
+    </p:extLst>
+  </p:cSld>
+  <p:clrMapOvr>
+    <a:masterClrMapping/>
+  </p:clrMapOvr>
+</p:sld>
+</file>
+
+<file path=ppt/slides/slide9.xml><?xml version="1.0" encoding="utf-8"?>
+<p:sld xmlns:a="http://schemas.openxmlformats.org/drawingml/2006/main" xmlns:r="http://schemas.openxmlformats.org/officeDocument/2006/relationships" xmlns:p="http://schemas.openxmlformats.org/presentationml/2006/main">
+  <p:cSld>
+    <p:spTree>
+      <p:nvGrpSpPr>
+        <p:cNvPr id="1" name=""/>
+        <p:cNvGrpSpPr/>
+        <p:nvPr/>
+      </p:nvGrpSpPr>
+      <p:grpSpPr>
+        <a:xfrm>
+          <a:off x="0" y="0"/>
+          <a:ext cx="0" cy="0"/>
+          <a:chOff x="0" y="0"/>
+          <a:chExt cx="0" cy="0"/>
+        </a:xfrm>
+      </p:grpSpPr>
+      <p:sp>
+        <p:nvSpPr>
+          <p:cNvPr id="2" name="Title 1">
+            <a:extLst>
+              <a:ext uri="{FF2B5EF4-FFF2-40B4-BE49-F238E27FC236}">
+                <a16:creationId xmlns:a16="http://schemas.microsoft.com/office/drawing/2014/main" id="{7B65C728-9D82-F58D-4AF1-8966DCC379BE}"/>
+              </a:ext>
+            </a:extLst>
+          </p:cNvPr>
+          <p:cNvSpPr>
+            <a:spLocks noGrp="1"/>
+          </p:cNvSpPr>
+          <p:nvPr>
+            <p:ph type="title"/>
+          </p:nvPr>
+        </p:nvSpPr>
+        <p:spPr/>
+        <p:txBody>
+          <a:bodyPr/>
+          <a:lstStyle/>
+          <a:p>
+            <a:endParaRPr lang="en-US"/>
+          </a:p>
+        </p:txBody>
+      </p:sp>
+      <p:sp>
+        <p:nvSpPr>
+          <p:cNvPr id="3" name="Content Placeholder 2">
+            <a:extLst>
+              <a:ext uri="{FF2B5EF4-FFF2-40B4-BE49-F238E27FC236}">
+                <a16:creationId xmlns:a16="http://schemas.microsoft.com/office/drawing/2014/main" id="{52C83551-39D9-AE0E-4578-517936715E6F}"/>
+              </a:ext>
+            </a:extLst>
+          </p:cNvPr>
+          <p:cNvSpPr>
+            <a:spLocks noGrp="1"/>
+          </p:cNvSpPr>
+          <p:nvPr>
+            <p:ph idx="1"/>
+          </p:nvPr>
+        </p:nvSpPr>
+        <p:spPr/>
+        <p:txBody>
+          <a:bodyPr/>
+          <a:lstStyle/>
+          <a:p>
+            <a:endParaRPr lang="en-US"/>
+          </a:p>
+        </p:txBody>
+      </p:sp>
+      <p:pic>
+        <p:nvPicPr>
+          <p:cNvPr id="5" name="Picture 4">
+            <a:extLst>
+              <a:ext uri="{FF2B5EF4-FFF2-40B4-BE49-F238E27FC236}">
+                <a16:creationId xmlns:a16="http://schemas.microsoft.com/office/drawing/2014/main" id="{05F04333-A061-CCEC-D713-41663A86CDE1}"/>
+              </a:ext>
+            </a:extLst>
+          </p:cNvPr>
+          <p:cNvPicPr>
+            <a:picLocks noChangeAspect="1"/>
+          </p:cNvPicPr>
+          <p:nvPr/>
+        </p:nvPicPr>
+        <p:blipFill>
+          <a:blip r:embed="rId2"/>
+          <a:stretch>
+            <a:fillRect/>
+          </a:stretch>
+        </p:blipFill>
+        <p:spPr>
+          <a:xfrm>
+            <a:off x="1681316" y="1657137"/>
+            <a:ext cx="9173497" cy="4519826"/>
+          </a:xfrm>
+          <a:prstGeom prst="rect">
+            <a:avLst/>
+          </a:prstGeom>
+        </p:spPr>
+      </p:pic>
+      <p:sp>
+        <p:nvSpPr>
+          <p:cNvPr id="6" name="Oval 5">
+            <a:extLst>
+              <a:ext uri="{FF2B5EF4-FFF2-40B4-BE49-F238E27FC236}">
+                <a16:creationId xmlns:a16="http://schemas.microsoft.com/office/drawing/2014/main" id="{CE48D909-9699-0A9C-2CCB-566A7334E459}"/>
+              </a:ext>
+            </a:extLst>
+          </p:cNvPr>
+          <p:cNvSpPr/>
+          <p:nvPr/>
+        </p:nvSpPr>
+        <p:spPr>
+          <a:xfrm>
+            <a:off x="1130710" y="4896465"/>
+            <a:ext cx="4031225" cy="737419"/>
+          </a:xfrm>
+          <a:prstGeom prst="ellipse">
+            <a:avLst/>
+          </a:prstGeom>
+          <a:noFill/>
+          <a:ln>
+            <a:solidFill>
+              <a:schemeClr val="bg1"/>
+            </a:solidFill>
+          </a:ln>
+        </p:spPr>
+        <p:style>
+          <a:lnRef idx="2">
+            <a:schemeClr val="accent1">
+              <a:shade val="15000"/>
+            </a:schemeClr>
+          </a:lnRef>
+          <a:fillRef idx="1">
+            <a:schemeClr val="accent1"/>
+          </a:fillRef>
+          <a:effectRef idx="0">
+            <a:schemeClr val="accent1"/>
+          </a:effectRef>
+          <a:fontRef idx="minor">
+            <a:schemeClr val="lt1"/>
+          </a:fontRef>
+        </p:style>
+        <p:txBody>
+          <a:bodyPr rtlCol="0" anchor="ctr"/>
+          <a:lstStyle/>
+          <a:p>
+            <a:pPr algn="ctr"/>
+            <a:endParaRPr lang="en-US"/>
+          </a:p>
+        </p:txBody>
+      </p:sp>
+      <p:sp>
+        <p:nvSpPr>
+          <p:cNvPr id="7" name="TextBox 6">
+            <a:extLst>
+              <a:ext uri="{FF2B5EF4-FFF2-40B4-BE49-F238E27FC236}">
+                <a16:creationId xmlns:a16="http://schemas.microsoft.com/office/drawing/2014/main" id="{FCD4C18D-3217-CCFB-5308-9785C164F36C}"/>
+              </a:ext>
+            </a:extLst>
+          </p:cNvPr>
+          <p:cNvSpPr txBox="1"/>
+          <p:nvPr/>
+        </p:nvSpPr>
+        <p:spPr>
+          <a:xfrm>
+            <a:off x="157315" y="5633884"/>
+            <a:ext cx="5774530" cy="369332"/>
+          </a:xfrm>
+          <a:prstGeom prst="rect">
+            <a:avLst/>
+          </a:prstGeom>
+          <a:noFill/>
+        </p:spPr>
+        <p:txBody>
+          <a:bodyPr wrap="none" rtlCol="0">
+            <a:spAutoFit/>
+          </a:bodyPr>
+          <a:lstStyle/>
+          <a:p>
+            <a:r>
+              <a:rPr lang="en-GB" dirty="0">
+                <a:solidFill>
+                  <a:schemeClr val="accent2">
+                    <a:lumMod val="75000"/>
+                  </a:schemeClr>
+                </a:solidFill>
+              </a:rPr>
+              <a:t>Inductor current naturally forces commutation of Diode</a:t>
+            </a:r>
+            <a:endParaRPr lang="en-US" dirty="0">
+              <a:solidFill>
+                <a:schemeClr val="accent2">
+                  <a:lumMod val="75000"/>
+                </a:schemeClr>
+              </a:solidFill>
+            </a:endParaRPr>
+          </a:p>
+        </p:txBody>
+      </p:sp>
+    </p:spTree>
+    <p:extLst>
+      <p:ext uri="{BB962C8B-B14F-4D97-AF65-F5344CB8AC3E}">
+        <p14:creationId xmlns:p14="http://schemas.microsoft.com/office/powerpoint/2010/main" val="2476712009"/>
       </p:ext>
     </p:extLst>
   </p:cSld>

</xml_diff>

<commit_message>
added reset button to reset the state of the DAB to Initialize
</commit_message>
<xml_diff>
--- a/dab_development.pptx
+++ b/dab_development.pptx
@@ -18,7 +18,9 @@
     <p:sldId id="266" r:id="rId12"/>
     <p:sldId id="267" r:id="rId13"/>
     <p:sldId id="268" r:id="rId14"/>
-    <p:sldId id="269" r:id="rId15"/>
+    <p:sldId id="271" r:id="rId15"/>
+    <p:sldId id="272" r:id="rId16"/>
+    <p:sldId id="273" r:id="rId17"/>
   </p:sldIdLst>
   <p:sldSz cx="12192000" cy="6858000"/>
   <p:notesSz cx="6858000" cy="9144000"/>
@@ -272,7 +274,7 @@
           <a:p>
             <a:fld id="{C8B5CE37-4518-4420-8E81-BDF4C2BF2F94}" type="datetimeFigureOut">
               <a:rPr lang="en-US" smtClean="0"/>
-              <a:t>7/23/2024</a:t>
+              <a:t>7/24/2024</a:t>
             </a:fld>
             <a:endParaRPr lang="en-US"/>
           </a:p>
@@ -470,7 +472,7 @@
           <a:p>
             <a:fld id="{C8B5CE37-4518-4420-8E81-BDF4C2BF2F94}" type="datetimeFigureOut">
               <a:rPr lang="en-US" smtClean="0"/>
-              <a:t>7/23/2024</a:t>
+              <a:t>7/24/2024</a:t>
             </a:fld>
             <a:endParaRPr lang="en-US"/>
           </a:p>
@@ -678,7 +680,7 @@
           <a:p>
             <a:fld id="{C8B5CE37-4518-4420-8E81-BDF4C2BF2F94}" type="datetimeFigureOut">
               <a:rPr lang="en-US" smtClean="0"/>
-              <a:t>7/23/2024</a:t>
+              <a:t>7/24/2024</a:t>
             </a:fld>
             <a:endParaRPr lang="en-US"/>
           </a:p>
@@ -876,7 +878,7 @@
           <a:p>
             <a:fld id="{C8B5CE37-4518-4420-8E81-BDF4C2BF2F94}" type="datetimeFigureOut">
               <a:rPr lang="en-US" smtClean="0"/>
-              <a:t>7/23/2024</a:t>
+              <a:t>7/24/2024</a:t>
             </a:fld>
             <a:endParaRPr lang="en-US"/>
           </a:p>
@@ -1151,7 +1153,7 @@
           <a:p>
             <a:fld id="{C8B5CE37-4518-4420-8E81-BDF4C2BF2F94}" type="datetimeFigureOut">
               <a:rPr lang="en-US" smtClean="0"/>
-              <a:t>7/23/2024</a:t>
+              <a:t>7/24/2024</a:t>
             </a:fld>
             <a:endParaRPr lang="en-US"/>
           </a:p>
@@ -1416,7 +1418,7 @@
           <a:p>
             <a:fld id="{C8B5CE37-4518-4420-8E81-BDF4C2BF2F94}" type="datetimeFigureOut">
               <a:rPr lang="en-US" smtClean="0"/>
-              <a:t>7/23/2024</a:t>
+              <a:t>7/24/2024</a:t>
             </a:fld>
             <a:endParaRPr lang="en-US"/>
           </a:p>
@@ -1828,7 +1830,7 @@
           <a:p>
             <a:fld id="{C8B5CE37-4518-4420-8E81-BDF4C2BF2F94}" type="datetimeFigureOut">
               <a:rPr lang="en-US" smtClean="0"/>
-              <a:t>7/23/2024</a:t>
+              <a:t>7/24/2024</a:t>
             </a:fld>
             <a:endParaRPr lang="en-US"/>
           </a:p>
@@ -1969,7 +1971,7 @@
           <a:p>
             <a:fld id="{C8B5CE37-4518-4420-8E81-BDF4C2BF2F94}" type="datetimeFigureOut">
               <a:rPr lang="en-US" smtClean="0"/>
-              <a:t>7/23/2024</a:t>
+              <a:t>7/24/2024</a:t>
             </a:fld>
             <a:endParaRPr lang="en-US"/>
           </a:p>
@@ -2082,7 +2084,7 @@
           <a:p>
             <a:fld id="{C8B5CE37-4518-4420-8E81-BDF4C2BF2F94}" type="datetimeFigureOut">
               <a:rPr lang="en-US" smtClean="0"/>
-              <a:t>7/23/2024</a:t>
+              <a:t>7/24/2024</a:t>
             </a:fld>
             <a:endParaRPr lang="en-US"/>
           </a:p>
@@ -2393,7 +2395,7 @@
           <a:p>
             <a:fld id="{C8B5CE37-4518-4420-8E81-BDF4C2BF2F94}" type="datetimeFigureOut">
               <a:rPr lang="en-US" smtClean="0"/>
-              <a:t>7/23/2024</a:t>
+              <a:t>7/24/2024</a:t>
             </a:fld>
             <a:endParaRPr lang="en-US"/>
           </a:p>
@@ -2681,7 +2683,7 @@
           <a:p>
             <a:fld id="{C8B5CE37-4518-4420-8E81-BDF4C2BF2F94}" type="datetimeFigureOut">
               <a:rPr lang="en-US" smtClean="0"/>
-              <a:t>7/23/2024</a:t>
+              <a:t>7/24/2024</a:t>
             </a:fld>
             <a:endParaRPr lang="en-US"/>
           </a:p>
@@ -2922,7 +2924,7 @@
           <a:p>
             <a:fld id="{C8B5CE37-4518-4420-8E81-BDF4C2BF2F94}" type="datetimeFigureOut">
               <a:rPr lang="en-US" smtClean="0"/>
-              <a:t>7/23/2024</a:t>
+              <a:t>7/24/2024</a:t>
             </a:fld>
             <a:endParaRPr lang="en-US"/>
           </a:p>
@@ -3880,7 +3882,7 @@
           <p:cNvPr id="2" name="Title 1">
             <a:extLst>
               <a:ext uri="{FF2B5EF4-FFF2-40B4-BE49-F238E27FC236}">
-                <a16:creationId xmlns:a16="http://schemas.microsoft.com/office/drawing/2014/main" id="{1E32A32D-96DE-6982-93F2-F5ECBFA20CFB}"/>
+                <a16:creationId xmlns:a16="http://schemas.microsoft.com/office/drawing/2014/main" id="{FFE6B41A-E821-202D-2A4A-4299DA41141C}"/>
               </a:ext>
             </a:extLst>
           </p:cNvPr>
@@ -3893,42 +3895,471 @@
         </p:nvSpPr>
         <p:spPr/>
         <p:txBody>
-          <a:bodyPr/>
-          <a:lstStyle/>
-          <a:p>
-            <a:endParaRPr lang="en-US"/>
-          </a:p>
-        </p:txBody>
-      </p:sp>
-      <p:sp>
-        <p:nvSpPr>
-          <p:cNvPr id="3" name="Content Placeholder 2">
-            <a:extLst>
-              <a:ext uri="{FF2B5EF4-FFF2-40B4-BE49-F238E27FC236}">
-                <a16:creationId xmlns:a16="http://schemas.microsoft.com/office/drawing/2014/main" id="{DFABC0B3-AE0C-341A-6500-5F1C2E5C447B}"/>
-              </a:ext>
-            </a:extLst>
-          </p:cNvPr>
-          <p:cNvSpPr>
-            <a:spLocks noGrp="1"/>
-          </p:cNvSpPr>
-          <p:nvPr>
-            <p:ph idx="1"/>
-          </p:nvPr>
-        </p:nvSpPr>
-        <p:spPr/>
-        <p:txBody>
-          <a:bodyPr/>
-          <a:lstStyle/>
-          <a:p>
-            <a:endParaRPr lang="en-US"/>
+          <a:bodyPr>
+            <a:normAutofit/>
+          </a:bodyPr>
+          <a:lstStyle/>
+          <a:p>
+            <a:r>
+              <a:rPr lang="en-GB" dirty="0"/>
+              <a:t>Actual testing to the DAB board in </a:t>
+            </a:r>
+            <a:r>
+              <a:rPr lang="en-GB" dirty="0" err="1"/>
+              <a:t>Garching</a:t>
+            </a:r>
+            <a:r>
+              <a:rPr lang="en-GB" dirty="0"/>
+              <a:t> (Open Loop measurement) – no Power flow</a:t>
+            </a:r>
+            <a:endParaRPr lang="en-US" dirty="0"/>
+          </a:p>
+        </p:txBody>
+      </p:sp>
+      <p:pic>
+        <p:nvPicPr>
+          <p:cNvPr id="1026" name="Picture 2">
+            <a:extLst>
+              <a:ext uri="{FF2B5EF4-FFF2-40B4-BE49-F238E27FC236}">
+                <a16:creationId xmlns:a16="http://schemas.microsoft.com/office/drawing/2014/main" id="{263FE4DB-229A-8AB1-A397-C3EEB3FF6D3F}"/>
+              </a:ext>
+            </a:extLst>
+          </p:cNvPr>
+          <p:cNvPicPr>
+            <a:picLocks noChangeAspect="1" noChangeArrowheads="1"/>
+          </p:cNvPicPr>
+          <p:nvPr/>
+        </p:nvPicPr>
+        <p:blipFill rotWithShape="1">
+          <a:blip r:embed="rId2">
+            <a:extLst>
+              <a:ext uri="{28A0092B-C50C-407E-A947-70E740481C1C}">
+                <a14:useLocalDpi xmlns:a14="http://schemas.microsoft.com/office/drawing/2010/main" val="0"/>
+              </a:ext>
+            </a:extLst>
+          </a:blip>
+          <a:srcRect l="2521" t="3871" r="6747" b="6523"/>
+          <a:stretch/>
+        </p:blipFill>
+        <p:spPr bwMode="auto">
+          <a:xfrm>
+            <a:off x="838200" y="2010506"/>
+            <a:ext cx="6912078" cy="4390293"/>
+          </a:xfrm>
+          <a:prstGeom prst="rect">
+            <a:avLst/>
+          </a:prstGeom>
+          <a:noFill/>
+          <a:extLst>
+            <a:ext uri="{909E8E84-426E-40DD-AFC4-6F175D3DCCD1}">
+              <a14:hiddenFill xmlns:a14="http://schemas.microsoft.com/office/drawing/2010/main">
+                <a:solidFill>
+                  <a:srgbClr val="FFFFFF"/>
+                </a:solidFill>
+              </a14:hiddenFill>
+            </a:ext>
+          </a:extLst>
+        </p:spPr>
+      </p:pic>
+      <p:sp>
+        <p:nvSpPr>
+          <p:cNvPr id="4" name="TextBox 3">
+            <a:extLst>
+              <a:ext uri="{FF2B5EF4-FFF2-40B4-BE49-F238E27FC236}">
+                <a16:creationId xmlns:a16="http://schemas.microsoft.com/office/drawing/2014/main" id="{CD2717E7-1D83-D8F1-A981-F002D3B39B61}"/>
+              </a:ext>
+            </a:extLst>
+          </p:cNvPr>
+          <p:cNvSpPr txBox="1"/>
+          <p:nvPr/>
+        </p:nvSpPr>
+        <p:spPr>
+          <a:xfrm>
+            <a:off x="8436077" y="2010506"/>
+            <a:ext cx="3008671" cy="2031325"/>
+          </a:xfrm>
+          <a:prstGeom prst="rect">
+            <a:avLst/>
+          </a:prstGeom>
+          <a:noFill/>
+        </p:spPr>
+        <p:txBody>
+          <a:bodyPr wrap="square" rtlCol="0">
+            <a:spAutoFit/>
+          </a:bodyPr>
+          <a:lstStyle/>
+          <a:p>
+            <a:r>
+              <a:rPr lang="en-GB" dirty="0"/>
+              <a:t>Control Phase: 0 degrees</a:t>
+            </a:r>
+          </a:p>
+          <a:p>
+            <a:r>
+              <a:rPr lang="en-GB" dirty="0"/>
+              <a:t>Primary side PWM</a:t>
+            </a:r>
+          </a:p>
+          <a:p>
+            <a:r>
+              <a:rPr lang="en-GB" dirty="0"/>
+              <a:t>PWM1: D0 D1</a:t>
+            </a:r>
+          </a:p>
+          <a:p>
+            <a:r>
+              <a:rPr lang="en-GB" dirty="0"/>
+              <a:t>PWM3: D2 D3</a:t>
+            </a:r>
+          </a:p>
+          <a:p>
+            <a:r>
+              <a:rPr lang="en-GB" dirty="0"/>
+              <a:t>Secondary side PWM</a:t>
+            </a:r>
+          </a:p>
+          <a:p>
+            <a:r>
+              <a:rPr lang="en-GB" dirty="0"/>
+              <a:t>PWM2: D4 D5</a:t>
+            </a:r>
+          </a:p>
+          <a:p>
+            <a:r>
+              <a:rPr lang="en-GB" dirty="0"/>
+              <a:t>PWM4: D6 D7</a:t>
+            </a:r>
+            <a:endParaRPr lang="en-US" dirty="0"/>
           </a:p>
         </p:txBody>
       </p:sp>
     </p:spTree>
     <p:extLst>
       <p:ext uri="{BB962C8B-B14F-4D97-AF65-F5344CB8AC3E}">
-        <p14:creationId xmlns:p14="http://schemas.microsoft.com/office/powerpoint/2010/main" val="1141618104"/>
+        <p14:creationId xmlns:p14="http://schemas.microsoft.com/office/powerpoint/2010/main" val="1130106906"/>
+      </p:ext>
+    </p:extLst>
+  </p:cSld>
+  <p:clrMapOvr>
+    <a:masterClrMapping/>
+  </p:clrMapOvr>
+</p:sld>
+</file>
+
+<file path=ppt/slides/slide15.xml><?xml version="1.0" encoding="utf-8"?>
+<p:sld xmlns:a="http://schemas.openxmlformats.org/drawingml/2006/main" xmlns:r="http://schemas.openxmlformats.org/officeDocument/2006/relationships" xmlns:p="http://schemas.openxmlformats.org/presentationml/2006/main">
+  <p:cSld>
+    <p:spTree>
+      <p:nvGrpSpPr>
+        <p:cNvPr id="1" name=""/>
+        <p:cNvGrpSpPr/>
+        <p:nvPr/>
+      </p:nvGrpSpPr>
+      <p:grpSpPr>
+        <a:xfrm>
+          <a:off x="0" y="0"/>
+          <a:ext cx="0" cy="0"/>
+          <a:chOff x="0" y="0"/>
+          <a:chExt cx="0" cy="0"/>
+        </a:xfrm>
+      </p:grpSpPr>
+      <p:sp>
+        <p:nvSpPr>
+          <p:cNvPr id="2" name="Title 1">
+            <a:extLst>
+              <a:ext uri="{FF2B5EF4-FFF2-40B4-BE49-F238E27FC236}">
+                <a16:creationId xmlns:a16="http://schemas.microsoft.com/office/drawing/2014/main" id="{FFE6B41A-E821-202D-2A4A-4299DA41141C}"/>
+              </a:ext>
+            </a:extLst>
+          </p:cNvPr>
+          <p:cNvSpPr>
+            <a:spLocks noGrp="1"/>
+          </p:cNvSpPr>
+          <p:nvPr>
+            <p:ph type="title"/>
+          </p:nvPr>
+        </p:nvSpPr>
+        <p:spPr/>
+        <p:txBody>
+          <a:bodyPr>
+            <a:normAutofit/>
+          </a:bodyPr>
+          <a:lstStyle/>
+          <a:p>
+            <a:r>
+              <a:rPr lang="en-GB" dirty="0"/>
+              <a:t>Actual testing to the DAB board in </a:t>
+            </a:r>
+            <a:r>
+              <a:rPr lang="en-GB" dirty="0" err="1"/>
+              <a:t>Garching</a:t>
+            </a:r>
+            <a:r>
+              <a:rPr lang="en-GB" dirty="0"/>
+              <a:t> (Open Loop measurement) – with Power flow</a:t>
+            </a:r>
+            <a:endParaRPr lang="en-US" dirty="0"/>
+          </a:p>
+        </p:txBody>
+      </p:sp>
+      <p:pic>
+        <p:nvPicPr>
+          <p:cNvPr id="2050" name="Picture 2">
+            <a:extLst>
+              <a:ext uri="{FF2B5EF4-FFF2-40B4-BE49-F238E27FC236}">
+                <a16:creationId xmlns:a16="http://schemas.microsoft.com/office/drawing/2014/main" id="{A6BCBADC-1FEC-F0B6-B2A4-F8F2F8BC6F0A}"/>
+              </a:ext>
+            </a:extLst>
+          </p:cNvPr>
+          <p:cNvPicPr>
+            <a:picLocks noChangeAspect="1" noChangeArrowheads="1"/>
+          </p:cNvPicPr>
+          <p:nvPr/>
+        </p:nvPicPr>
+        <p:blipFill>
+          <a:blip r:embed="rId2">
+            <a:extLst>
+              <a:ext uri="{28A0092B-C50C-407E-A947-70E740481C1C}">
+                <a14:useLocalDpi xmlns:a14="http://schemas.microsoft.com/office/drawing/2010/main" val="0"/>
+              </a:ext>
+            </a:extLst>
+          </a:blip>
+          <a:srcRect/>
+          <a:stretch>
+            <a:fillRect/>
+          </a:stretch>
+        </p:blipFill>
+        <p:spPr bwMode="auto">
+          <a:xfrm>
+            <a:off x="527022" y="1690688"/>
+            <a:ext cx="7909055" cy="5076084"/>
+          </a:xfrm>
+          <a:prstGeom prst="rect">
+            <a:avLst/>
+          </a:prstGeom>
+          <a:noFill/>
+          <a:extLst>
+            <a:ext uri="{909E8E84-426E-40DD-AFC4-6F175D3DCCD1}">
+              <a14:hiddenFill xmlns:a14="http://schemas.microsoft.com/office/drawing/2010/main">
+                <a:solidFill>
+                  <a:srgbClr val="FFFFFF"/>
+                </a:solidFill>
+              </a14:hiddenFill>
+            </a:ext>
+          </a:extLst>
+        </p:spPr>
+      </p:pic>
+      <p:sp>
+        <p:nvSpPr>
+          <p:cNvPr id="3" name="TextBox 2">
+            <a:extLst>
+              <a:ext uri="{FF2B5EF4-FFF2-40B4-BE49-F238E27FC236}">
+                <a16:creationId xmlns:a16="http://schemas.microsoft.com/office/drawing/2014/main" id="{C5141766-D058-FA2E-1F7E-3F97E6EBDC98}"/>
+              </a:ext>
+            </a:extLst>
+          </p:cNvPr>
+          <p:cNvSpPr txBox="1"/>
+          <p:nvPr/>
+        </p:nvSpPr>
+        <p:spPr>
+          <a:xfrm>
+            <a:off x="8656307" y="2059668"/>
+            <a:ext cx="3008671" cy="4247317"/>
+          </a:xfrm>
+          <a:prstGeom prst="rect">
+            <a:avLst/>
+          </a:prstGeom>
+          <a:noFill/>
+        </p:spPr>
+        <p:txBody>
+          <a:bodyPr wrap="square" rtlCol="0">
+            <a:spAutoFit/>
+          </a:bodyPr>
+          <a:lstStyle/>
+          <a:p>
+            <a:r>
+              <a:rPr lang="en-GB" dirty="0"/>
+              <a:t>Control Phase: 90 degrees</a:t>
+            </a:r>
+          </a:p>
+          <a:p>
+            <a:r>
+              <a:rPr lang="en-GB" dirty="0"/>
+              <a:t>Primary side PWM</a:t>
+            </a:r>
+          </a:p>
+          <a:p>
+            <a:r>
+              <a:rPr lang="en-GB" dirty="0"/>
+              <a:t>PWM1: D0 D1</a:t>
+            </a:r>
+          </a:p>
+          <a:p>
+            <a:r>
+              <a:rPr lang="en-GB" dirty="0"/>
+              <a:t>PWM3: D2 D3</a:t>
+            </a:r>
+          </a:p>
+          <a:p>
+            <a:r>
+              <a:rPr lang="en-GB" dirty="0"/>
+              <a:t>Secondary side PWM</a:t>
+            </a:r>
+          </a:p>
+          <a:p>
+            <a:r>
+              <a:rPr lang="en-GB" dirty="0"/>
+              <a:t>PWM2: D4 D5</a:t>
+            </a:r>
+          </a:p>
+          <a:p>
+            <a:r>
+              <a:rPr lang="en-GB" dirty="0"/>
+              <a:t>PWM4: D6 D7</a:t>
+            </a:r>
+          </a:p>
+          <a:p>
+            <a:endParaRPr lang="en-GB" dirty="0"/>
+          </a:p>
+          <a:p>
+            <a:r>
+              <a:rPr lang="en-GB" dirty="0"/>
+              <a:t>C1 – yellow (primary Bridge voltage)</a:t>
+            </a:r>
+          </a:p>
+          <a:p>
+            <a:r>
+              <a:rPr lang="en-GB" dirty="0"/>
+              <a:t>C2 - green (transformer current)</a:t>
+            </a:r>
+          </a:p>
+          <a:p>
+            <a:r>
+              <a:rPr lang="en-GB" dirty="0"/>
+              <a:t>C3 - orange (secondary Bridge voltage)</a:t>
+            </a:r>
+          </a:p>
+          <a:p>
+            <a:endParaRPr lang="en-US" dirty="0"/>
+          </a:p>
+        </p:txBody>
+      </p:sp>
+    </p:spTree>
+    <p:extLst>
+      <p:ext uri="{BB962C8B-B14F-4D97-AF65-F5344CB8AC3E}">
+        <p14:creationId xmlns:p14="http://schemas.microsoft.com/office/powerpoint/2010/main" val="23066602"/>
+      </p:ext>
+    </p:extLst>
+  </p:cSld>
+  <p:clrMapOvr>
+    <a:masterClrMapping/>
+  </p:clrMapOvr>
+</p:sld>
+</file>
+
+<file path=ppt/slides/slide16.xml><?xml version="1.0" encoding="utf-8"?>
+<p:sld xmlns:a="http://schemas.openxmlformats.org/drawingml/2006/main" xmlns:r="http://schemas.openxmlformats.org/officeDocument/2006/relationships" xmlns:p="http://schemas.openxmlformats.org/presentationml/2006/main">
+  <p:cSld>
+    <p:spTree>
+      <p:nvGrpSpPr>
+        <p:cNvPr id="1" name=""/>
+        <p:cNvGrpSpPr/>
+        <p:nvPr/>
+      </p:nvGrpSpPr>
+      <p:grpSpPr>
+        <a:xfrm>
+          <a:off x="0" y="0"/>
+          <a:ext cx="0" cy="0"/>
+          <a:chOff x="0" y="0"/>
+          <a:chExt cx="0" cy="0"/>
+        </a:xfrm>
+      </p:grpSpPr>
+      <p:sp>
+        <p:nvSpPr>
+          <p:cNvPr id="2" name="Title 1">
+            <a:extLst>
+              <a:ext uri="{FF2B5EF4-FFF2-40B4-BE49-F238E27FC236}">
+                <a16:creationId xmlns:a16="http://schemas.microsoft.com/office/drawing/2014/main" id="{C8402A76-8AE9-4755-0BC2-F7DA5663EEAC}"/>
+              </a:ext>
+            </a:extLst>
+          </p:cNvPr>
+          <p:cNvSpPr>
+            <a:spLocks noGrp="1"/>
+          </p:cNvSpPr>
+          <p:nvPr>
+            <p:ph type="title"/>
+          </p:nvPr>
+        </p:nvSpPr>
+        <p:spPr/>
+        <p:txBody>
+          <a:bodyPr/>
+          <a:lstStyle/>
+          <a:p>
+            <a:r>
+              <a:rPr lang="en-GB" dirty="0"/>
+              <a:t>Actual testing to the DAB board in </a:t>
+            </a:r>
+            <a:r>
+              <a:rPr lang="en-GB" dirty="0" err="1"/>
+              <a:t>Garching</a:t>
+            </a:r>
+            <a:r>
+              <a:rPr lang="en-GB" dirty="0"/>
+              <a:t> (Open Loop measurement) – with Power flow</a:t>
+            </a:r>
+            <a:endParaRPr lang="en-US" dirty="0"/>
+          </a:p>
+        </p:txBody>
+      </p:sp>
+      <p:pic>
+        <p:nvPicPr>
+          <p:cNvPr id="3074" name="Picture 2">
+            <a:extLst>
+              <a:ext uri="{FF2B5EF4-FFF2-40B4-BE49-F238E27FC236}">
+                <a16:creationId xmlns:a16="http://schemas.microsoft.com/office/drawing/2014/main" id="{2058AFCD-1213-599E-75B1-8DD9A8EF4AAF}"/>
+              </a:ext>
+            </a:extLst>
+          </p:cNvPr>
+          <p:cNvPicPr>
+            <a:picLocks noChangeAspect="1" noChangeArrowheads="1"/>
+          </p:cNvPicPr>
+          <p:nvPr/>
+        </p:nvPicPr>
+        <p:blipFill rotWithShape="1">
+          <a:blip r:embed="rId2">
+            <a:extLst>
+              <a:ext uri="{28A0092B-C50C-407E-A947-70E740481C1C}">
+                <a14:useLocalDpi xmlns:a14="http://schemas.microsoft.com/office/drawing/2010/main" val="0"/>
+              </a:ext>
+            </a:extLst>
+          </a:blip>
+          <a:srcRect r="2132"/>
+          <a:stretch/>
+        </p:blipFill>
+        <p:spPr bwMode="auto">
+          <a:xfrm>
+            <a:off x="1356851" y="1943747"/>
+            <a:ext cx="9478297" cy="4165210"/>
+          </a:xfrm>
+          <a:prstGeom prst="rect">
+            <a:avLst/>
+          </a:prstGeom>
+          <a:noFill/>
+          <a:extLst>
+            <a:ext uri="{909E8E84-426E-40DD-AFC4-6F175D3DCCD1}">
+              <a14:hiddenFill xmlns:a14="http://schemas.microsoft.com/office/drawing/2010/main">
+                <a:solidFill>
+                  <a:srgbClr val="FFFFFF"/>
+                </a:solidFill>
+              </a14:hiddenFill>
+            </a:ext>
+          </a:extLst>
+        </p:spPr>
+      </p:pic>
+    </p:spTree>
+    <p:extLst>
+      <p:ext uri="{BB962C8B-B14F-4D97-AF65-F5344CB8AC3E}">
+        <p14:creationId xmlns:p14="http://schemas.microsoft.com/office/powerpoint/2010/main" val="730229403"/>
       </p:ext>
     </p:extLst>
   </p:cSld>

</xml_diff>

<commit_message>
minor renaming in the project
</commit_message>
<xml_diff>
--- a/dab_development.pptx
+++ b/dab_development.pptx
@@ -274,7 +274,7 @@
           <a:p>
             <a:fld id="{C8B5CE37-4518-4420-8E81-BDF4C2BF2F94}" type="datetimeFigureOut">
               <a:rPr lang="en-US" smtClean="0"/>
-              <a:t>7/24/2024</a:t>
+              <a:t>7/25/2024</a:t>
             </a:fld>
             <a:endParaRPr lang="en-US"/>
           </a:p>
@@ -472,7 +472,7 @@
           <a:p>
             <a:fld id="{C8B5CE37-4518-4420-8E81-BDF4C2BF2F94}" type="datetimeFigureOut">
               <a:rPr lang="en-US" smtClean="0"/>
-              <a:t>7/24/2024</a:t>
+              <a:t>7/25/2024</a:t>
             </a:fld>
             <a:endParaRPr lang="en-US"/>
           </a:p>
@@ -680,7 +680,7 @@
           <a:p>
             <a:fld id="{C8B5CE37-4518-4420-8E81-BDF4C2BF2F94}" type="datetimeFigureOut">
               <a:rPr lang="en-US" smtClean="0"/>
-              <a:t>7/24/2024</a:t>
+              <a:t>7/25/2024</a:t>
             </a:fld>
             <a:endParaRPr lang="en-US"/>
           </a:p>
@@ -878,7 +878,7 @@
           <a:p>
             <a:fld id="{C8B5CE37-4518-4420-8E81-BDF4C2BF2F94}" type="datetimeFigureOut">
               <a:rPr lang="en-US" smtClean="0"/>
-              <a:t>7/24/2024</a:t>
+              <a:t>7/25/2024</a:t>
             </a:fld>
             <a:endParaRPr lang="en-US"/>
           </a:p>
@@ -1153,7 +1153,7 @@
           <a:p>
             <a:fld id="{C8B5CE37-4518-4420-8E81-BDF4C2BF2F94}" type="datetimeFigureOut">
               <a:rPr lang="en-US" smtClean="0"/>
-              <a:t>7/24/2024</a:t>
+              <a:t>7/25/2024</a:t>
             </a:fld>
             <a:endParaRPr lang="en-US"/>
           </a:p>
@@ -1418,7 +1418,7 @@
           <a:p>
             <a:fld id="{C8B5CE37-4518-4420-8E81-BDF4C2BF2F94}" type="datetimeFigureOut">
               <a:rPr lang="en-US" smtClean="0"/>
-              <a:t>7/24/2024</a:t>
+              <a:t>7/25/2024</a:t>
             </a:fld>
             <a:endParaRPr lang="en-US"/>
           </a:p>
@@ -1830,7 +1830,7 @@
           <a:p>
             <a:fld id="{C8B5CE37-4518-4420-8E81-BDF4C2BF2F94}" type="datetimeFigureOut">
               <a:rPr lang="en-US" smtClean="0"/>
-              <a:t>7/24/2024</a:t>
+              <a:t>7/25/2024</a:t>
             </a:fld>
             <a:endParaRPr lang="en-US"/>
           </a:p>
@@ -1971,7 +1971,7 @@
           <a:p>
             <a:fld id="{C8B5CE37-4518-4420-8E81-BDF4C2BF2F94}" type="datetimeFigureOut">
               <a:rPr lang="en-US" smtClean="0"/>
-              <a:t>7/24/2024</a:t>
+              <a:t>7/25/2024</a:t>
             </a:fld>
             <a:endParaRPr lang="en-US"/>
           </a:p>
@@ -2084,7 +2084,7 @@
           <a:p>
             <a:fld id="{C8B5CE37-4518-4420-8E81-BDF4C2BF2F94}" type="datetimeFigureOut">
               <a:rPr lang="en-US" smtClean="0"/>
-              <a:t>7/24/2024</a:t>
+              <a:t>7/25/2024</a:t>
             </a:fld>
             <a:endParaRPr lang="en-US"/>
           </a:p>
@@ -2395,7 +2395,7 @@
           <a:p>
             <a:fld id="{C8B5CE37-4518-4420-8E81-BDF4C2BF2F94}" type="datetimeFigureOut">
               <a:rPr lang="en-US" smtClean="0"/>
-              <a:t>7/24/2024</a:t>
+              <a:t>7/25/2024</a:t>
             </a:fld>
             <a:endParaRPr lang="en-US"/>
           </a:p>
@@ -2683,7 +2683,7 @@
           <a:p>
             <a:fld id="{C8B5CE37-4518-4420-8E81-BDF4C2BF2F94}" type="datetimeFigureOut">
               <a:rPr lang="en-US" smtClean="0"/>
-              <a:t>7/24/2024</a:t>
+              <a:t>7/25/2024</a:t>
             </a:fld>
             <a:endParaRPr lang="en-US"/>
           </a:p>
@@ -2924,7 +2924,7 @@
           <a:p>
             <a:fld id="{C8B5CE37-4518-4420-8E81-BDF4C2BF2F94}" type="datetimeFigureOut">
               <a:rPr lang="en-US" smtClean="0"/>
-              <a:t>7/24/2024</a:t>
+              <a:t>7/25/2024</a:t>
             </a:fld>
             <a:endParaRPr lang="en-US"/>
           </a:p>

</xml_diff>

<commit_message>
added Deadtime High and Low API
</commit_message>
<xml_diff>
--- a/dab_development.pptx
+++ b/dab_development.pptx
@@ -274,7 +274,7 @@
           <a:p>
             <a:fld id="{C8B5CE37-4518-4420-8E81-BDF4C2BF2F94}" type="datetimeFigureOut">
               <a:rPr lang="en-US" smtClean="0"/>
-              <a:t>7/25/2024</a:t>
+              <a:t>7/26/2024</a:t>
             </a:fld>
             <a:endParaRPr lang="en-US"/>
           </a:p>
@@ -472,7 +472,7 @@
           <a:p>
             <a:fld id="{C8B5CE37-4518-4420-8E81-BDF4C2BF2F94}" type="datetimeFigureOut">
               <a:rPr lang="en-US" smtClean="0"/>
-              <a:t>7/25/2024</a:t>
+              <a:t>7/26/2024</a:t>
             </a:fld>
             <a:endParaRPr lang="en-US"/>
           </a:p>
@@ -680,7 +680,7 @@
           <a:p>
             <a:fld id="{C8B5CE37-4518-4420-8E81-BDF4C2BF2F94}" type="datetimeFigureOut">
               <a:rPr lang="en-US" smtClean="0"/>
-              <a:t>7/25/2024</a:t>
+              <a:t>7/26/2024</a:t>
             </a:fld>
             <a:endParaRPr lang="en-US"/>
           </a:p>
@@ -878,7 +878,7 @@
           <a:p>
             <a:fld id="{C8B5CE37-4518-4420-8E81-BDF4C2BF2F94}" type="datetimeFigureOut">
               <a:rPr lang="en-US" smtClean="0"/>
-              <a:t>7/25/2024</a:t>
+              <a:t>7/26/2024</a:t>
             </a:fld>
             <a:endParaRPr lang="en-US"/>
           </a:p>
@@ -1153,7 +1153,7 @@
           <a:p>
             <a:fld id="{C8B5CE37-4518-4420-8E81-BDF4C2BF2F94}" type="datetimeFigureOut">
               <a:rPr lang="en-US" smtClean="0"/>
-              <a:t>7/25/2024</a:t>
+              <a:t>7/26/2024</a:t>
             </a:fld>
             <a:endParaRPr lang="en-US"/>
           </a:p>
@@ -1418,7 +1418,7 @@
           <a:p>
             <a:fld id="{C8B5CE37-4518-4420-8E81-BDF4C2BF2F94}" type="datetimeFigureOut">
               <a:rPr lang="en-US" smtClean="0"/>
-              <a:t>7/25/2024</a:t>
+              <a:t>7/26/2024</a:t>
             </a:fld>
             <a:endParaRPr lang="en-US"/>
           </a:p>
@@ -1830,7 +1830,7 @@
           <a:p>
             <a:fld id="{C8B5CE37-4518-4420-8E81-BDF4C2BF2F94}" type="datetimeFigureOut">
               <a:rPr lang="en-US" smtClean="0"/>
-              <a:t>7/25/2024</a:t>
+              <a:t>7/26/2024</a:t>
             </a:fld>
             <a:endParaRPr lang="en-US"/>
           </a:p>
@@ -1971,7 +1971,7 @@
           <a:p>
             <a:fld id="{C8B5CE37-4518-4420-8E81-BDF4C2BF2F94}" type="datetimeFigureOut">
               <a:rPr lang="en-US" smtClean="0"/>
-              <a:t>7/25/2024</a:t>
+              <a:t>7/26/2024</a:t>
             </a:fld>
             <a:endParaRPr lang="en-US"/>
           </a:p>
@@ -2084,7 +2084,7 @@
           <a:p>
             <a:fld id="{C8B5CE37-4518-4420-8E81-BDF4C2BF2F94}" type="datetimeFigureOut">
               <a:rPr lang="en-US" smtClean="0"/>
-              <a:t>7/25/2024</a:t>
+              <a:t>7/26/2024</a:t>
             </a:fld>
             <a:endParaRPr lang="en-US"/>
           </a:p>
@@ -2395,7 +2395,7 @@
           <a:p>
             <a:fld id="{C8B5CE37-4518-4420-8E81-BDF4C2BF2F94}" type="datetimeFigureOut">
               <a:rPr lang="en-US" smtClean="0"/>
-              <a:t>7/25/2024</a:t>
+              <a:t>7/26/2024</a:t>
             </a:fld>
             <a:endParaRPr lang="en-US"/>
           </a:p>
@@ -2683,7 +2683,7 @@
           <a:p>
             <a:fld id="{C8B5CE37-4518-4420-8E81-BDF4C2BF2F94}" type="datetimeFigureOut">
               <a:rPr lang="en-US" smtClean="0"/>
-              <a:t>7/25/2024</a:t>
+              <a:t>7/26/2024</a:t>
             </a:fld>
             <a:endParaRPr lang="en-US"/>
           </a:p>
@@ -2924,7 +2924,7 @@
           <a:p>
             <a:fld id="{C8B5CE37-4518-4420-8E81-BDF4C2BF2F94}" type="datetimeFigureOut">
               <a:rPr lang="en-US" smtClean="0"/>
-              <a:t>7/25/2024</a:t>
+              <a:t>7/26/2024</a:t>
             </a:fld>
             <a:endParaRPr lang="en-US"/>
           </a:p>

</xml_diff>

<commit_message>
rename ControlLoop_Interrupt with ControlLoop_Interrupt_CallBack
</commit_message>
<xml_diff>
--- a/dab_development.pptx
+++ b/dab_development.pptx
@@ -21,6 +21,7 @@
     <p:sldId id="271" r:id="rId15"/>
     <p:sldId id="272" r:id="rId16"/>
     <p:sldId id="273" r:id="rId17"/>
+    <p:sldId id="274" r:id="rId18"/>
   </p:sldIdLst>
   <p:sldSz cx="12192000" cy="6858000"/>
   <p:notesSz cx="6858000" cy="9144000"/>
@@ -274,7 +275,7 @@
           <a:p>
             <a:fld id="{C8B5CE37-4518-4420-8E81-BDF4C2BF2F94}" type="datetimeFigureOut">
               <a:rPr lang="en-US" smtClean="0"/>
-              <a:t>7/26/2024</a:t>
+              <a:t>8/7/2024</a:t>
             </a:fld>
             <a:endParaRPr lang="en-US"/>
           </a:p>
@@ -472,7 +473,7 @@
           <a:p>
             <a:fld id="{C8B5CE37-4518-4420-8E81-BDF4C2BF2F94}" type="datetimeFigureOut">
               <a:rPr lang="en-US" smtClean="0"/>
-              <a:t>7/26/2024</a:t>
+              <a:t>8/7/2024</a:t>
             </a:fld>
             <a:endParaRPr lang="en-US"/>
           </a:p>
@@ -680,7 +681,7 @@
           <a:p>
             <a:fld id="{C8B5CE37-4518-4420-8E81-BDF4C2BF2F94}" type="datetimeFigureOut">
               <a:rPr lang="en-US" smtClean="0"/>
-              <a:t>7/26/2024</a:t>
+              <a:t>8/7/2024</a:t>
             </a:fld>
             <a:endParaRPr lang="en-US"/>
           </a:p>
@@ -878,7 +879,7 @@
           <a:p>
             <a:fld id="{C8B5CE37-4518-4420-8E81-BDF4C2BF2F94}" type="datetimeFigureOut">
               <a:rPr lang="en-US" smtClean="0"/>
-              <a:t>7/26/2024</a:t>
+              <a:t>8/7/2024</a:t>
             </a:fld>
             <a:endParaRPr lang="en-US"/>
           </a:p>
@@ -1153,7 +1154,7 @@
           <a:p>
             <a:fld id="{C8B5CE37-4518-4420-8E81-BDF4C2BF2F94}" type="datetimeFigureOut">
               <a:rPr lang="en-US" smtClean="0"/>
-              <a:t>7/26/2024</a:t>
+              <a:t>8/7/2024</a:t>
             </a:fld>
             <a:endParaRPr lang="en-US"/>
           </a:p>
@@ -1418,7 +1419,7 @@
           <a:p>
             <a:fld id="{C8B5CE37-4518-4420-8E81-BDF4C2BF2F94}" type="datetimeFigureOut">
               <a:rPr lang="en-US" smtClean="0"/>
-              <a:t>7/26/2024</a:t>
+              <a:t>8/7/2024</a:t>
             </a:fld>
             <a:endParaRPr lang="en-US"/>
           </a:p>
@@ -1830,7 +1831,7 @@
           <a:p>
             <a:fld id="{C8B5CE37-4518-4420-8E81-BDF4C2BF2F94}" type="datetimeFigureOut">
               <a:rPr lang="en-US" smtClean="0"/>
-              <a:t>7/26/2024</a:t>
+              <a:t>8/7/2024</a:t>
             </a:fld>
             <a:endParaRPr lang="en-US"/>
           </a:p>
@@ -1971,7 +1972,7 @@
           <a:p>
             <a:fld id="{C8B5CE37-4518-4420-8E81-BDF4C2BF2F94}" type="datetimeFigureOut">
               <a:rPr lang="en-US" smtClean="0"/>
-              <a:t>7/26/2024</a:t>
+              <a:t>8/7/2024</a:t>
             </a:fld>
             <a:endParaRPr lang="en-US"/>
           </a:p>
@@ -2084,7 +2085,7 @@
           <a:p>
             <a:fld id="{C8B5CE37-4518-4420-8E81-BDF4C2BF2F94}" type="datetimeFigureOut">
               <a:rPr lang="en-US" smtClean="0"/>
-              <a:t>7/26/2024</a:t>
+              <a:t>8/7/2024</a:t>
             </a:fld>
             <a:endParaRPr lang="en-US"/>
           </a:p>
@@ -2395,7 +2396,7 @@
           <a:p>
             <a:fld id="{C8B5CE37-4518-4420-8E81-BDF4C2BF2F94}" type="datetimeFigureOut">
               <a:rPr lang="en-US" smtClean="0"/>
-              <a:t>7/26/2024</a:t>
+              <a:t>8/7/2024</a:t>
             </a:fld>
             <a:endParaRPr lang="en-US"/>
           </a:p>
@@ -2683,7 +2684,7 @@
           <a:p>
             <a:fld id="{C8B5CE37-4518-4420-8E81-BDF4C2BF2F94}" type="datetimeFigureOut">
               <a:rPr lang="en-US" smtClean="0"/>
-              <a:t>7/26/2024</a:t>
+              <a:t>8/7/2024</a:t>
             </a:fld>
             <a:endParaRPr lang="en-US"/>
           </a:p>
@@ -2924,7 +2925,7 @@
           <a:p>
             <a:fld id="{C8B5CE37-4518-4420-8E81-BDF4C2BF2F94}" type="datetimeFigureOut">
               <a:rPr lang="en-US" smtClean="0"/>
-              <a:t>7/26/2024</a:t>
+              <a:t>8/7/2024</a:t>
             </a:fld>
             <a:endParaRPr lang="en-US"/>
           </a:p>
@@ -4360,6 +4361,86 @@
     <p:extLst>
       <p:ext uri="{BB962C8B-B14F-4D97-AF65-F5344CB8AC3E}">
         <p14:creationId xmlns:p14="http://schemas.microsoft.com/office/powerpoint/2010/main" val="730229403"/>
+      </p:ext>
+    </p:extLst>
+  </p:cSld>
+  <p:clrMapOvr>
+    <a:masterClrMapping/>
+  </p:clrMapOvr>
+</p:sld>
+</file>
+
+<file path=ppt/slides/slide17.xml><?xml version="1.0" encoding="utf-8"?>
+<p:sld xmlns:a="http://schemas.openxmlformats.org/drawingml/2006/main" xmlns:r="http://schemas.openxmlformats.org/officeDocument/2006/relationships" xmlns:p="http://schemas.openxmlformats.org/presentationml/2006/main">
+  <p:cSld>
+    <p:spTree>
+      <p:nvGrpSpPr>
+        <p:cNvPr id="1" name=""/>
+        <p:cNvGrpSpPr/>
+        <p:nvPr/>
+      </p:nvGrpSpPr>
+      <p:grpSpPr>
+        <a:xfrm>
+          <a:off x="0" y="0"/>
+          <a:ext cx="0" cy="0"/>
+          <a:chOff x="0" y="0"/>
+          <a:chExt cx="0" cy="0"/>
+        </a:xfrm>
+      </p:grpSpPr>
+      <p:sp>
+        <p:nvSpPr>
+          <p:cNvPr id="2" name="Title 1">
+            <a:extLst>
+              <a:ext uri="{FF2B5EF4-FFF2-40B4-BE49-F238E27FC236}">
+                <a16:creationId xmlns:a16="http://schemas.microsoft.com/office/drawing/2014/main" id="{C6266ED7-1F5B-2606-8AA8-29B0EFE79B91}"/>
+              </a:ext>
+            </a:extLst>
+          </p:cNvPr>
+          <p:cNvSpPr>
+            <a:spLocks noGrp="1"/>
+          </p:cNvSpPr>
+          <p:nvPr>
+            <p:ph type="title"/>
+          </p:nvPr>
+        </p:nvSpPr>
+        <p:spPr/>
+        <p:txBody>
+          <a:bodyPr/>
+          <a:lstStyle/>
+          <a:p>
+            <a:endParaRPr lang="en-US"/>
+          </a:p>
+        </p:txBody>
+      </p:sp>
+      <p:sp>
+        <p:nvSpPr>
+          <p:cNvPr id="3" name="Content Placeholder 2">
+            <a:extLst>
+              <a:ext uri="{FF2B5EF4-FFF2-40B4-BE49-F238E27FC236}">
+                <a16:creationId xmlns:a16="http://schemas.microsoft.com/office/drawing/2014/main" id="{7D27A30E-5A7B-0A2A-EC4D-358901E62CD0}"/>
+              </a:ext>
+            </a:extLst>
+          </p:cNvPr>
+          <p:cNvSpPr>
+            <a:spLocks noGrp="1"/>
+          </p:cNvSpPr>
+          <p:nvPr>
+            <p:ph idx="1"/>
+          </p:nvPr>
+        </p:nvSpPr>
+        <p:spPr/>
+        <p:txBody>
+          <a:bodyPr/>
+          <a:lstStyle/>
+          <a:p>
+            <a:endParaRPr lang="en-US"/>
+          </a:p>
+        </p:txBody>
+      </p:sp>
+    </p:spTree>
+    <p:extLst>
+      <p:ext uri="{BB962C8B-B14F-4D97-AF65-F5344CB8AC3E}">
+        <p14:creationId xmlns:p14="http://schemas.microsoft.com/office/powerpoint/2010/main" val="2455258004"/>
       </p:ext>
     </p:extLst>
   </p:cSld>

</xml_diff>